<commit_message>
made some changes to presentation
</commit_message>
<xml_diff>
--- a/docs/Splunk.pptx
+++ b/docs/Splunk.pptx
@@ -13,15 +13,15 @@
     <p:sldId id="259" r:id="rId4"/>
     <p:sldId id="260" r:id="rId5"/>
     <p:sldId id="261" r:id="rId6"/>
-    <p:sldId id="262" r:id="rId7"/>
-    <p:sldId id="263" r:id="rId8"/>
-    <p:sldId id="264" r:id="rId9"/>
-    <p:sldId id="265" r:id="rId10"/>
-    <p:sldId id="266" r:id="rId11"/>
-    <p:sldId id="268" r:id="rId12"/>
-    <p:sldId id="269" r:id="rId13"/>
-    <p:sldId id="270" r:id="rId14"/>
-    <p:sldId id="271" r:id="rId15"/>
+    <p:sldId id="271" r:id="rId7"/>
+    <p:sldId id="262" r:id="rId8"/>
+    <p:sldId id="263" r:id="rId9"/>
+    <p:sldId id="264" r:id="rId10"/>
+    <p:sldId id="265" r:id="rId11"/>
+    <p:sldId id="266" r:id="rId12"/>
+    <p:sldId id="268" r:id="rId13"/>
+    <p:sldId id="269" r:id="rId14"/>
+    <p:sldId id="270" r:id="rId15"/>
     <p:sldId id="272" r:id="rId16"/>
     <p:sldId id="273" r:id="rId17"/>
     <p:sldId id="274" r:id="rId18"/>
@@ -31,21 +31,21 @@
   <p:notesSz cx="6858000" cy="9144000"/>
   <p:embeddedFontLst>
     <p:embeddedFont>
-      <p:font typeface="Calibri" panose="020F0502020204030204" pitchFamily="34" charset="0"/>
+      <p:font typeface="Lato" panose="020B0604020202020204" charset="0"/>
       <p:regular r:id="rId21"/>
       <p:bold r:id="rId22"/>
       <p:italic r:id="rId23"/>
       <p:boldItalic r:id="rId24"/>
     </p:embeddedFont>
     <p:embeddedFont>
-      <p:font typeface="Lato" panose="020B0604020202020204" charset="0"/>
+      <p:font typeface="Montserrat" panose="020B0604020202020204" charset="0"/>
       <p:regular r:id="rId25"/>
       <p:bold r:id="rId26"/>
       <p:italic r:id="rId27"/>
       <p:boldItalic r:id="rId28"/>
     </p:embeddedFont>
     <p:embeddedFont>
-      <p:font typeface="Montserrat" panose="020B0604020202020204" charset="0"/>
+      <p:font typeface="Calibri" panose="020F0502020204030204" pitchFamily="34" charset="0"/>
       <p:regular r:id="rId29"/>
       <p:bold r:id="rId30"/>
       <p:italic r:id="rId31"/>
@@ -850,6 +850,110 @@
   <p:cSld>
     <p:spTree>
       <p:nvGrpSpPr>
+        <p:cNvPr id="1" name="Shape 189"/>
+        <p:cNvGrpSpPr/>
+        <p:nvPr/>
+      </p:nvGrpSpPr>
+      <p:grpSpPr>
+        <a:xfrm>
+          <a:off x="0" y="0"/>
+          <a:ext cx="0" cy="0"/>
+          <a:chOff x="0" y="0"/>
+          <a:chExt cx="0" cy="0"/>
+        </a:xfrm>
+      </p:grpSpPr>
+      <p:sp>
+        <p:nvSpPr>
+          <p:cNvPr id="190" name="Google Shape;190;g73f83e47d6_0_647:notes"/>
+          <p:cNvSpPr>
+            <a:spLocks noGrp="1" noRot="1" noChangeAspect="1"/>
+          </p:cNvSpPr>
+          <p:nvPr>
+            <p:ph type="sldImg" idx="2"/>
+          </p:nvPr>
+        </p:nvSpPr>
+        <p:spPr>
+          <a:xfrm>
+            <a:off x="381000" y="685800"/>
+            <a:ext cx="6096000" cy="3429000"/>
+          </a:xfrm>
+          <a:custGeom>
+            <a:avLst/>
+            <a:gdLst/>
+            <a:ahLst/>
+            <a:cxnLst/>
+            <a:rect l="l" t="t" r="r" b="b"/>
+            <a:pathLst>
+              <a:path w="120000" h="120000" extrusionOk="0">
+                <a:moveTo>
+                  <a:pt x="0" y="0"/>
+                </a:moveTo>
+                <a:lnTo>
+                  <a:pt x="120000" y="0"/>
+                </a:lnTo>
+                <a:lnTo>
+                  <a:pt x="120000" y="120000"/>
+                </a:lnTo>
+                <a:lnTo>
+                  <a:pt x="0" y="120000"/>
+                </a:lnTo>
+                <a:close/>
+              </a:path>
+            </a:pathLst>
+          </a:custGeom>
+        </p:spPr>
+      </p:sp>
+      <p:sp>
+        <p:nvSpPr>
+          <p:cNvPr id="191" name="Google Shape;191;g73f83e47d6_0_647:notes"/>
+          <p:cNvSpPr txBox="1">
+            <a:spLocks noGrp="1"/>
+          </p:cNvSpPr>
+          <p:nvPr>
+            <p:ph type="body" idx="1"/>
+          </p:nvPr>
+        </p:nvSpPr>
+        <p:spPr>
+          <a:xfrm>
+            <a:off x="685800" y="4343400"/>
+            <a:ext cx="5486400" cy="4114800"/>
+          </a:xfrm>
+          <a:prstGeom prst="rect">
+            <a:avLst/>
+          </a:prstGeom>
+        </p:spPr>
+        <p:txBody>
+          <a:bodyPr spcFirstLastPara="1" wrap="square" lIns="91425" tIns="91425" rIns="91425" bIns="91425" anchor="t" anchorCtr="0">
+            <a:noAutofit/>
+          </a:bodyPr>
+          <a:lstStyle/>
+          <a:p>
+            <a:pPr marL="0" lvl="0" indent="0" algn="l" rtl="0">
+              <a:spcBef>
+                <a:spcPts val="0"/>
+              </a:spcBef>
+              <a:spcAft>
+                <a:spcPts val="0"/>
+              </a:spcAft>
+              <a:buNone/>
+            </a:pPr>
+            <a:endParaRPr/>
+          </a:p>
+        </p:txBody>
+      </p:sp>
+    </p:spTree>
+  </p:cSld>
+  <p:clrMapOvr>
+    <a:masterClrMapping/>
+  </p:clrMapOvr>
+</p:notes>
+</file>
+
+<file path=ppt/notesSlides/notesSlide11.xml><?xml version="1.0" encoding="utf-8"?>
+<p:notes xmlns:a="http://schemas.openxmlformats.org/drawingml/2006/main" xmlns:r="http://schemas.openxmlformats.org/officeDocument/2006/relationships" xmlns:p="http://schemas.openxmlformats.org/presentationml/2006/main" showMasterSp="0" showMasterPhAnim="0">
+  <p:cSld>
+    <p:spTree>
+      <p:nvGrpSpPr>
         <p:cNvPr id="1" name="Shape 196"/>
         <p:cNvGrpSpPr/>
         <p:nvPr/>
@@ -949,7 +1053,7 @@
 </p:notes>
 </file>
 
-<file path=ppt/notesSlides/notesSlide11.xml><?xml version="1.0" encoding="utf-8"?>
+<file path=ppt/notesSlides/notesSlide12.xml><?xml version="1.0" encoding="utf-8"?>
 <p:notes xmlns:a="http://schemas.openxmlformats.org/drawingml/2006/main" xmlns:r="http://schemas.openxmlformats.org/officeDocument/2006/relationships" xmlns:p="http://schemas.openxmlformats.org/presentationml/2006/main" showMasterSp="0" showMasterPhAnim="0">
   <p:cSld>
     <p:spTree>
@@ -1053,7 +1157,7 @@
 </p:notes>
 </file>
 
-<file path=ppt/notesSlides/notesSlide12.xml><?xml version="1.0" encoding="utf-8"?>
+<file path=ppt/notesSlides/notesSlide13.xml><?xml version="1.0" encoding="utf-8"?>
 <p:notes xmlns:a="http://schemas.openxmlformats.org/drawingml/2006/main" xmlns:r="http://schemas.openxmlformats.org/officeDocument/2006/relationships" xmlns:p="http://schemas.openxmlformats.org/presentationml/2006/main" showMasterSp="0" showMasterPhAnim="0">
   <p:cSld>
     <p:spTree>
@@ -1157,7 +1261,7 @@
 </p:notes>
 </file>
 
-<file path=ppt/notesSlides/notesSlide13.xml><?xml version="1.0" encoding="utf-8"?>
+<file path=ppt/notesSlides/notesSlide14.xml><?xml version="1.0" encoding="utf-8"?>
 <p:notes xmlns:a="http://schemas.openxmlformats.org/drawingml/2006/main" xmlns:r="http://schemas.openxmlformats.org/officeDocument/2006/relationships" xmlns:p="http://schemas.openxmlformats.org/presentationml/2006/main" showMasterSp="0" showMasterPhAnim="0">
   <p:cSld>
     <p:spTree>
@@ -1218,110 +1322,6 @@
       <p:sp>
         <p:nvSpPr>
           <p:cNvPr id="222" name="Google Shape;222;g73f83e47d6_0_688:notes"/>
-          <p:cNvSpPr txBox="1">
-            <a:spLocks noGrp="1"/>
-          </p:cNvSpPr>
-          <p:nvPr>
-            <p:ph type="body" idx="1"/>
-          </p:nvPr>
-        </p:nvSpPr>
-        <p:spPr>
-          <a:xfrm>
-            <a:off x="685800" y="4343400"/>
-            <a:ext cx="5486400" cy="4114800"/>
-          </a:xfrm>
-          <a:prstGeom prst="rect">
-            <a:avLst/>
-          </a:prstGeom>
-        </p:spPr>
-        <p:txBody>
-          <a:bodyPr spcFirstLastPara="1" wrap="square" lIns="91425" tIns="91425" rIns="91425" bIns="91425" anchor="t" anchorCtr="0">
-            <a:noAutofit/>
-          </a:bodyPr>
-          <a:lstStyle/>
-          <a:p>
-            <a:pPr marL="0" lvl="0" indent="0" algn="l" rtl="0">
-              <a:spcBef>
-                <a:spcPts val="0"/>
-              </a:spcBef>
-              <a:spcAft>
-                <a:spcPts val="0"/>
-              </a:spcAft>
-              <a:buNone/>
-            </a:pPr>
-            <a:endParaRPr/>
-          </a:p>
-        </p:txBody>
-      </p:sp>
-    </p:spTree>
-  </p:cSld>
-  <p:clrMapOvr>
-    <a:masterClrMapping/>
-  </p:clrMapOvr>
-</p:notes>
-</file>
-
-<file path=ppt/notesSlides/notesSlide14.xml><?xml version="1.0" encoding="utf-8"?>
-<p:notes xmlns:a="http://schemas.openxmlformats.org/drawingml/2006/main" xmlns:r="http://schemas.openxmlformats.org/officeDocument/2006/relationships" xmlns:p="http://schemas.openxmlformats.org/presentationml/2006/main" showMasterSp="0" showMasterPhAnim="0">
-  <p:cSld>
-    <p:spTree>
-      <p:nvGrpSpPr>
-        <p:cNvPr id="1" name="Shape 226"/>
-        <p:cNvGrpSpPr/>
-        <p:nvPr/>
-      </p:nvGrpSpPr>
-      <p:grpSpPr>
-        <a:xfrm>
-          <a:off x="0" y="0"/>
-          <a:ext cx="0" cy="0"/>
-          <a:chOff x="0" y="0"/>
-          <a:chExt cx="0" cy="0"/>
-        </a:xfrm>
-      </p:grpSpPr>
-      <p:sp>
-        <p:nvSpPr>
-          <p:cNvPr id="227" name="Google Shape;227;g73ff5a289e_0_1:notes"/>
-          <p:cNvSpPr>
-            <a:spLocks noGrp="1" noRot="1" noChangeAspect="1"/>
-          </p:cNvSpPr>
-          <p:nvPr>
-            <p:ph type="sldImg" idx="2"/>
-          </p:nvPr>
-        </p:nvSpPr>
-        <p:spPr>
-          <a:xfrm>
-            <a:off x="381000" y="685800"/>
-            <a:ext cx="6096000" cy="3429000"/>
-          </a:xfrm>
-          <a:custGeom>
-            <a:avLst/>
-            <a:gdLst/>
-            <a:ahLst/>
-            <a:cxnLst/>
-            <a:rect l="l" t="t" r="r" b="b"/>
-            <a:pathLst>
-              <a:path w="120000" h="120000" extrusionOk="0">
-                <a:moveTo>
-                  <a:pt x="0" y="0"/>
-                </a:moveTo>
-                <a:lnTo>
-                  <a:pt x="120000" y="0"/>
-                </a:lnTo>
-                <a:lnTo>
-                  <a:pt x="120000" y="120000"/>
-                </a:lnTo>
-                <a:lnTo>
-                  <a:pt x="0" y="120000"/>
-                </a:lnTo>
-                <a:close/>
-              </a:path>
-            </a:pathLst>
-          </a:custGeom>
-        </p:spPr>
-      </p:sp>
-      <p:sp>
-        <p:nvSpPr>
-          <p:cNvPr id="228" name="Google Shape;228;g73ff5a289e_0_1:notes"/>
           <p:cNvSpPr txBox="1">
             <a:spLocks noGrp="1"/>
           </p:cNvSpPr>
@@ -2329,6 +2329,110 @@
   <p:cSld>
     <p:spTree>
       <p:nvGrpSpPr>
+        <p:cNvPr id="1" name="Shape 226"/>
+        <p:cNvGrpSpPr/>
+        <p:nvPr/>
+      </p:nvGrpSpPr>
+      <p:grpSpPr>
+        <a:xfrm>
+          <a:off x="0" y="0"/>
+          <a:ext cx="0" cy="0"/>
+          <a:chOff x="0" y="0"/>
+          <a:chExt cx="0" cy="0"/>
+        </a:xfrm>
+      </p:grpSpPr>
+      <p:sp>
+        <p:nvSpPr>
+          <p:cNvPr id="227" name="Google Shape;227;g73ff5a289e_0_1:notes"/>
+          <p:cNvSpPr>
+            <a:spLocks noGrp="1" noRot="1" noChangeAspect="1"/>
+          </p:cNvSpPr>
+          <p:nvPr>
+            <p:ph type="sldImg" idx="2"/>
+          </p:nvPr>
+        </p:nvSpPr>
+        <p:spPr>
+          <a:xfrm>
+            <a:off x="381000" y="685800"/>
+            <a:ext cx="6096000" cy="3429000"/>
+          </a:xfrm>
+          <a:custGeom>
+            <a:avLst/>
+            <a:gdLst/>
+            <a:ahLst/>
+            <a:cxnLst/>
+            <a:rect l="l" t="t" r="r" b="b"/>
+            <a:pathLst>
+              <a:path w="120000" h="120000" extrusionOk="0">
+                <a:moveTo>
+                  <a:pt x="0" y="0"/>
+                </a:moveTo>
+                <a:lnTo>
+                  <a:pt x="120000" y="0"/>
+                </a:lnTo>
+                <a:lnTo>
+                  <a:pt x="120000" y="120000"/>
+                </a:lnTo>
+                <a:lnTo>
+                  <a:pt x="0" y="120000"/>
+                </a:lnTo>
+                <a:close/>
+              </a:path>
+            </a:pathLst>
+          </a:custGeom>
+        </p:spPr>
+      </p:sp>
+      <p:sp>
+        <p:nvSpPr>
+          <p:cNvPr id="228" name="Google Shape;228;g73ff5a289e_0_1:notes"/>
+          <p:cNvSpPr txBox="1">
+            <a:spLocks noGrp="1"/>
+          </p:cNvSpPr>
+          <p:nvPr>
+            <p:ph type="body" idx="1"/>
+          </p:nvPr>
+        </p:nvSpPr>
+        <p:spPr>
+          <a:xfrm>
+            <a:off x="685800" y="4343400"/>
+            <a:ext cx="5486400" cy="4114800"/>
+          </a:xfrm>
+          <a:prstGeom prst="rect">
+            <a:avLst/>
+          </a:prstGeom>
+        </p:spPr>
+        <p:txBody>
+          <a:bodyPr spcFirstLastPara="1" wrap="square" lIns="91425" tIns="91425" rIns="91425" bIns="91425" anchor="t" anchorCtr="0">
+            <a:noAutofit/>
+          </a:bodyPr>
+          <a:lstStyle/>
+          <a:p>
+            <a:pPr marL="0" lvl="0" indent="0" algn="l" rtl="0">
+              <a:spcBef>
+                <a:spcPts val="0"/>
+              </a:spcBef>
+              <a:spcAft>
+                <a:spcPts val="0"/>
+              </a:spcAft>
+              <a:buNone/>
+            </a:pPr>
+            <a:endParaRPr/>
+          </a:p>
+        </p:txBody>
+      </p:sp>
+    </p:spTree>
+  </p:cSld>
+  <p:clrMapOvr>
+    <a:masterClrMapping/>
+  </p:clrMapOvr>
+</p:notes>
+</file>
+
+<file path=ppt/notesSlides/notesSlide7.xml><?xml version="1.0" encoding="utf-8"?>
+<p:notes xmlns:a="http://schemas.openxmlformats.org/drawingml/2006/main" xmlns:r="http://schemas.openxmlformats.org/officeDocument/2006/relationships" xmlns:p="http://schemas.openxmlformats.org/presentationml/2006/main" showMasterSp="0" showMasterPhAnim="0">
+  <p:cSld>
+    <p:spTree>
+      <p:nvGrpSpPr>
         <p:cNvPr id="1" name="Shape 171"/>
         <p:cNvGrpSpPr/>
         <p:nvPr/>
@@ -2428,7 +2532,7 @@
 </p:notes>
 </file>
 
-<file path=ppt/notesSlides/notesSlide7.xml><?xml version="1.0" encoding="utf-8"?>
+<file path=ppt/notesSlides/notesSlide8.xml><?xml version="1.0" encoding="utf-8"?>
 <p:notes xmlns:a="http://schemas.openxmlformats.org/drawingml/2006/main" xmlns:r="http://schemas.openxmlformats.org/officeDocument/2006/relationships" xmlns:p="http://schemas.openxmlformats.org/presentationml/2006/main" showMasterSp="0" showMasterPhAnim="0">
   <p:cSld>
     <p:spTree>
@@ -2532,7 +2636,7 @@
 </p:notes>
 </file>
 
-<file path=ppt/notesSlides/notesSlide8.xml><?xml version="1.0" encoding="utf-8"?>
+<file path=ppt/notesSlides/notesSlide9.xml><?xml version="1.0" encoding="utf-8"?>
 <p:notes xmlns:a="http://schemas.openxmlformats.org/drawingml/2006/main" xmlns:r="http://schemas.openxmlformats.org/officeDocument/2006/relationships" xmlns:p="http://schemas.openxmlformats.org/presentationml/2006/main" showMasterSp="0" showMasterPhAnim="0">
   <p:cSld>
     <p:spTree>
@@ -2593,110 +2697,6 @@
       <p:sp>
         <p:nvSpPr>
           <p:cNvPr id="185" name="Google Shape;185;g73f83e47d6_0_640:notes"/>
-          <p:cNvSpPr txBox="1">
-            <a:spLocks noGrp="1"/>
-          </p:cNvSpPr>
-          <p:nvPr>
-            <p:ph type="body" idx="1"/>
-          </p:nvPr>
-        </p:nvSpPr>
-        <p:spPr>
-          <a:xfrm>
-            <a:off x="685800" y="4343400"/>
-            <a:ext cx="5486400" cy="4114800"/>
-          </a:xfrm>
-          <a:prstGeom prst="rect">
-            <a:avLst/>
-          </a:prstGeom>
-        </p:spPr>
-        <p:txBody>
-          <a:bodyPr spcFirstLastPara="1" wrap="square" lIns="91425" tIns="91425" rIns="91425" bIns="91425" anchor="t" anchorCtr="0">
-            <a:noAutofit/>
-          </a:bodyPr>
-          <a:lstStyle/>
-          <a:p>
-            <a:pPr marL="0" lvl="0" indent="0" algn="l" rtl="0">
-              <a:spcBef>
-                <a:spcPts val="0"/>
-              </a:spcBef>
-              <a:spcAft>
-                <a:spcPts val="0"/>
-              </a:spcAft>
-              <a:buNone/>
-            </a:pPr>
-            <a:endParaRPr/>
-          </a:p>
-        </p:txBody>
-      </p:sp>
-    </p:spTree>
-  </p:cSld>
-  <p:clrMapOvr>
-    <a:masterClrMapping/>
-  </p:clrMapOvr>
-</p:notes>
-</file>
-
-<file path=ppt/notesSlides/notesSlide9.xml><?xml version="1.0" encoding="utf-8"?>
-<p:notes xmlns:a="http://schemas.openxmlformats.org/drawingml/2006/main" xmlns:r="http://schemas.openxmlformats.org/officeDocument/2006/relationships" xmlns:p="http://schemas.openxmlformats.org/presentationml/2006/main" showMasterSp="0" showMasterPhAnim="0">
-  <p:cSld>
-    <p:spTree>
-      <p:nvGrpSpPr>
-        <p:cNvPr id="1" name="Shape 189"/>
-        <p:cNvGrpSpPr/>
-        <p:nvPr/>
-      </p:nvGrpSpPr>
-      <p:grpSpPr>
-        <a:xfrm>
-          <a:off x="0" y="0"/>
-          <a:ext cx="0" cy="0"/>
-          <a:chOff x="0" y="0"/>
-          <a:chExt cx="0" cy="0"/>
-        </a:xfrm>
-      </p:grpSpPr>
-      <p:sp>
-        <p:nvSpPr>
-          <p:cNvPr id="190" name="Google Shape;190;g73f83e47d6_0_647:notes"/>
-          <p:cNvSpPr>
-            <a:spLocks noGrp="1" noRot="1" noChangeAspect="1"/>
-          </p:cNvSpPr>
-          <p:nvPr>
-            <p:ph type="sldImg" idx="2"/>
-          </p:nvPr>
-        </p:nvSpPr>
-        <p:spPr>
-          <a:xfrm>
-            <a:off x="381000" y="685800"/>
-            <a:ext cx="6096000" cy="3429000"/>
-          </a:xfrm>
-          <a:custGeom>
-            <a:avLst/>
-            <a:gdLst/>
-            <a:ahLst/>
-            <a:cxnLst/>
-            <a:rect l="l" t="t" r="r" b="b"/>
-            <a:pathLst>
-              <a:path w="120000" h="120000" extrusionOk="0">
-                <a:moveTo>
-                  <a:pt x="0" y="0"/>
-                </a:moveTo>
-                <a:lnTo>
-                  <a:pt x="120000" y="0"/>
-                </a:lnTo>
-                <a:lnTo>
-                  <a:pt x="120000" y="120000"/>
-                </a:lnTo>
-                <a:lnTo>
-                  <a:pt x="0" y="120000"/>
-                </a:lnTo>
-                <a:close/>
-              </a:path>
-            </a:pathLst>
-          </a:custGeom>
-        </p:spPr>
-      </p:sp>
-      <p:sp>
-        <p:nvSpPr>
-          <p:cNvPr id="191" name="Google Shape;191;g73f83e47d6_0_647:notes"/>
           <p:cNvSpPr txBox="1">
             <a:spLocks noGrp="1"/>
           </p:cNvSpPr>
@@ -10909,6 +10909,193 @@
   <p:cSld>
     <p:spTree>
       <p:nvGrpSpPr>
+        <p:cNvPr id="1" name="Shape 192"/>
+        <p:cNvGrpSpPr/>
+        <p:nvPr/>
+      </p:nvGrpSpPr>
+      <p:grpSpPr>
+        <a:xfrm>
+          <a:off x="0" y="0"/>
+          <a:ext cx="0" cy="0"/>
+          <a:chOff x="0" y="0"/>
+          <a:chExt cx="0" cy="0"/>
+        </a:xfrm>
+      </p:grpSpPr>
+      <p:sp>
+        <p:nvSpPr>
+          <p:cNvPr id="193" name="Google Shape;193;p22"/>
+          <p:cNvSpPr txBox="1">
+            <a:spLocks noGrp="1"/>
+          </p:cNvSpPr>
+          <p:nvPr>
+            <p:ph type="title"/>
+          </p:nvPr>
+        </p:nvSpPr>
+        <p:spPr>
+          <a:xfrm>
+            <a:off x="1297500" y="393750"/>
+            <a:ext cx="7038900" cy="914100"/>
+          </a:xfrm>
+          <a:prstGeom prst="rect">
+            <a:avLst/>
+          </a:prstGeom>
+        </p:spPr>
+        <p:txBody>
+          <a:bodyPr spcFirstLastPara="1" wrap="square" lIns="91425" tIns="91425" rIns="91425" bIns="91425" anchor="t" anchorCtr="0">
+            <a:noAutofit/>
+          </a:bodyPr>
+          <a:lstStyle/>
+          <a:p>
+            <a:pPr marL="0" lvl="0" indent="0" algn="l" rtl="0">
+              <a:spcBef>
+                <a:spcPts val="0"/>
+              </a:spcBef>
+              <a:spcAft>
+                <a:spcPts val="0"/>
+              </a:spcAft>
+              <a:buNone/>
+            </a:pPr>
+            <a:r>
+              <a:rPr lang="en" dirty="0">
+                <a:latin typeface="Times New Roman" panose="02020603050405020304" pitchFamily="18" charset="0"/>
+                <a:cs typeface="Times New Roman" panose="02020603050405020304" pitchFamily="18" charset="0"/>
+              </a:rPr>
+              <a:t>How splunk Works?</a:t>
+            </a:r>
+            <a:endParaRPr dirty="0">
+              <a:latin typeface="Times New Roman" panose="02020603050405020304" pitchFamily="18" charset="0"/>
+              <a:cs typeface="Times New Roman" panose="02020603050405020304" pitchFamily="18" charset="0"/>
+            </a:endParaRPr>
+          </a:p>
+        </p:txBody>
+      </p:sp>
+      <p:sp>
+        <p:nvSpPr>
+          <p:cNvPr id="194" name="Google Shape;194;p22"/>
+          <p:cNvSpPr txBox="1">
+            <a:spLocks noGrp="1"/>
+          </p:cNvSpPr>
+          <p:nvPr>
+            <p:ph type="body" idx="1"/>
+          </p:nvPr>
+        </p:nvSpPr>
+        <p:spPr>
+          <a:xfrm>
+            <a:off x="1297499" y="1567549"/>
+            <a:ext cx="7336137" cy="3397855"/>
+          </a:xfrm>
+          <a:prstGeom prst="rect">
+            <a:avLst/>
+          </a:prstGeom>
+        </p:spPr>
+        <p:txBody>
+          <a:bodyPr spcFirstLastPara="1" wrap="square" lIns="91425" tIns="91425" rIns="91425" bIns="91425" anchor="t" anchorCtr="0">
+            <a:noAutofit/>
+          </a:bodyPr>
+          <a:lstStyle/>
+          <a:p>
+            <a:pPr marL="0" lvl="0" indent="0" algn="l" rtl="0">
+              <a:spcBef>
+                <a:spcPts val="0"/>
+              </a:spcBef>
+              <a:spcAft>
+                <a:spcPts val="1600"/>
+              </a:spcAft>
+              <a:buNone/>
+            </a:pPr>
+            <a:endParaRPr dirty="0">
+              <a:latin typeface="Times New Roman" panose="02020603050405020304" pitchFamily="18" charset="0"/>
+              <a:cs typeface="Times New Roman" panose="02020603050405020304" pitchFamily="18" charset="0"/>
+            </a:endParaRPr>
+          </a:p>
+        </p:txBody>
+      </p:sp>
+      <p:pic>
+        <p:nvPicPr>
+          <p:cNvPr id="195" name="Google Shape;195;p22"/>
+          <p:cNvPicPr preferRelativeResize="0"/>
+          <p:nvPr/>
+        </p:nvPicPr>
+        <p:blipFill>
+          <a:blip r:embed="rId3">
+            <a:alphaModFix/>
+          </a:blip>
+          <a:stretch>
+            <a:fillRect/>
+          </a:stretch>
+        </p:blipFill>
+        <p:spPr>
+          <a:xfrm>
+            <a:off x="1297499" y="1567549"/>
+            <a:ext cx="6878937" cy="2664208"/>
+          </a:xfrm>
+          <a:prstGeom prst="rect">
+            <a:avLst/>
+          </a:prstGeom>
+          <a:noFill/>
+          <a:ln>
+            <a:noFill/>
+          </a:ln>
+        </p:spPr>
+      </p:pic>
+      <p:sp>
+        <p:nvSpPr>
+          <p:cNvPr id="2" name="Rectangle 1">
+            <a:extLst>
+              <a:ext uri="{FF2B5EF4-FFF2-40B4-BE49-F238E27FC236}">
+                <a16:creationId xmlns:a16="http://schemas.microsoft.com/office/drawing/2014/main" id="{59EB8D04-1B9B-47B0-B0B9-06637FFA2881}"/>
+              </a:ext>
+            </a:extLst>
+          </p:cNvPr>
+          <p:cNvSpPr/>
+          <p:nvPr/>
+        </p:nvSpPr>
+        <p:spPr>
+          <a:xfrm>
+            <a:off x="6834066" y="4595861"/>
+            <a:ext cx="1502334" cy="307777"/>
+          </a:xfrm>
+          <a:prstGeom prst="rect">
+            <a:avLst/>
+          </a:prstGeom>
+        </p:spPr>
+        <p:txBody>
+          <a:bodyPr wrap="none">
+            <a:spAutoFit/>
+          </a:bodyPr>
+          <a:lstStyle/>
+          <a:p>
+            <a:r>
+              <a:rPr lang="en" dirty="0">
+                <a:solidFill>
+                  <a:schemeClr val="bg1"/>
+                </a:solidFill>
+                <a:latin typeface="Times New Roman" panose="02020603050405020304" pitchFamily="18" charset="0"/>
+                <a:cs typeface="Times New Roman" panose="02020603050405020304" pitchFamily="18" charset="0"/>
+              </a:rPr>
+              <a:t>DurgaPrasadVSM</a:t>
+            </a:r>
+            <a:endParaRPr lang="en-US" dirty="0">
+              <a:solidFill>
+                <a:schemeClr val="bg1"/>
+              </a:solidFill>
+            </a:endParaRPr>
+          </a:p>
+        </p:txBody>
+      </p:sp>
+    </p:spTree>
+  </p:cSld>
+  <p:clrMapOvr>
+    <a:masterClrMapping/>
+  </p:clrMapOvr>
+</p:sld>
+</file>
+
+<file path=ppt/slides/slide11.xml><?xml version="1.0" encoding="utf-8"?>
+<p:sld xmlns:a="http://schemas.openxmlformats.org/drawingml/2006/main" xmlns:r="http://schemas.openxmlformats.org/officeDocument/2006/relationships" xmlns:p="http://schemas.openxmlformats.org/presentationml/2006/main">
+  <p:cSld>
+    <p:spTree>
+      <p:nvGrpSpPr>
         <p:cNvPr id="1" name="Shape 199"/>
         <p:cNvGrpSpPr/>
         <p:nvPr/>
@@ -11168,7 +11355,7 @@
 </p:sld>
 </file>
 
-<file path=ppt/slides/slide11.xml><?xml version="1.0" encoding="utf-8"?>
+<file path=ppt/slides/slide12.xml><?xml version="1.0" encoding="utf-8"?>
 <p:sld xmlns:a="http://schemas.openxmlformats.org/drawingml/2006/main" xmlns:r="http://schemas.openxmlformats.org/officeDocument/2006/relationships" xmlns:p="http://schemas.openxmlformats.org/presentationml/2006/main">
   <p:cSld>
     <p:spTree>
@@ -11376,7 +11563,7 @@
 </p:sld>
 </file>
 
-<file path=ppt/slides/slide12.xml><?xml version="1.0" encoding="utf-8"?>
+<file path=ppt/slides/slide13.xml><?xml version="1.0" encoding="utf-8"?>
 <p:sld xmlns:a="http://schemas.openxmlformats.org/drawingml/2006/main" xmlns:r="http://schemas.openxmlformats.org/officeDocument/2006/relationships" xmlns:p="http://schemas.openxmlformats.org/presentationml/2006/main">
   <p:cSld>
     <p:spTree>
@@ -11588,7 +11775,7 @@
 </p:sld>
 </file>
 
-<file path=ppt/slides/slide13.xml><?xml version="1.0" encoding="utf-8"?>
+<file path=ppt/slides/slide14.xml><?xml version="1.0" encoding="utf-8"?>
 <p:sld xmlns:a="http://schemas.openxmlformats.org/drawingml/2006/main" xmlns:r="http://schemas.openxmlformats.org/officeDocument/2006/relationships" xmlns:p="http://schemas.openxmlformats.org/presentationml/2006/main">
   <p:cSld>
     <p:spTree>
@@ -11812,145 +11999,6 @@
               <a:cs typeface="Times New Roman"/>
               <a:sym typeface="Times New Roman"/>
             </a:endParaRPr>
-          </a:p>
-        </p:txBody>
-      </p:sp>
-    </p:spTree>
-  </p:cSld>
-  <p:clrMapOvr>
-    <a:masterClrMapping/>
-  </p:clrMapOvr>
-</p:sld>
-</file>
-
-<file path=ppt/slides/slide14.xml><?xml version="1.0" encoding="utf-8"?>
-<p:sld xmlns:a="http://schemas.openxmlformats.org/drawingml/2006/main" xmlns:r="http://schemas.openxmlformats.org/officeDocument/2006/relationships" xmlns:p="http://schemas.openxmlformats.org/presentationml/2006/main">
-  <p:cSld>
-    <p:spTree>
-      <p:nvGrpSpPr>
-        <p:cNvPr id="1" name="Shape 229"/>
-        <p:cNvGrpSpPr/>
-        <p:nvPr/>
-      </p:nvGrpSpPr>
-      <p:grpSpPr>
-        <a:xfrm>
-          <a:off x="0" y="0"/>
-          <a:ext cx="0" cy="0"/>
-          <a:chOff x="0" y="0"/>
-          <a:chExt cx="0" cy="0"/>
-        </a:xfrm>
-      </p:grpSpPr>
-      <p:sp>
-        <p:nvSpPr>
-          <p:cNvPr id="230" name="Google Shape;230;p28"/>
-          <p:cNvSpPr txBox="1">
-            <a:spLocks noGrp="1"/>
-          </p:cNvSpPr>
-          <p:nvPr>
-            <p:ph type="title"/>
-          </p:nvPr>
-        </p:nvSpPr>
-        <p:spPr>
-          <a:xfrm>
-            <a:off x="1297500" y="393750"/>
-            <a:ext cx="7038900" cy="914100"/>
-          </a:xfrm>
-          <a:prstGeom prst="rect">
-            <a:avLst/>
-          </a:prstGeom>
-        </p:spPr>
-        <p:txBody>
-          <a:bodyPr spcFirstLastPara="1" wrap="square" lIns="91425" tIns="91425" rIns="91425" bIns="91425" anchor="t" anchorCtr="0">
-            <a:noAutofit/>
-          </a:bodyPr>
-          <a:lstStyle/>
-          <a:p>
-            <a:pPr marL="0" lvl="0" indent="0" algn="l" rtl="0">
-              <a:spcBef>
-                <a:spcPts val="0"/>
-              </a:spcBef>
-              <a:spcAft>
-                <a:spcPts val="0"/>
-              </a:spcAft>
-              <a:buNone/>
-            </a:pPr>
-            <a:r>
-              <a:rPr lang="en"/>
-              <a:t>Splunk Architecture</a:t>
-            </a:r>
-            <a:endParaRPr/>
-          </a:p>
-        </p:txBody>
-      </p:sp>
-      <p:pic>
-        <p:nvPicPr>
-          <p:cNvPr id="231" name="Google Shape;231;p28"/>
-          <p:cNvPicPr preferRelativeResize="0"/>
-          <p:nvPr/>
-        </p:nvPicPr>
-        <p:blipFill rotWithShape="1">
-          <a:blip r:embed="rId3">
-            <a:alphaModFix/>
-          </a:blip>
-          <a:srcRect r="2534" b="7902"/>
-          <a:stretch/>
-        </p:blipFill>
-        <p:spPr>
-          <a:xfrm>
-            <a:off x="1297500" y="938435"/>
-            <a:ext cx="7445700" cy="3686727"/>
-          </a:xfrm>
-          <a:prstGeom prst="rect">
-            <a:avLst/>
-          </a:prstGeom>
-          <a:noFill/>
-          <a:ln>
-            <a:noFill/>
-          </a:ln>
-        </p:spPr>
-      </p:pic>
-      <p:sp>
-        <p:nvSpPr>
-          <p:cNvPr id="2" name="Rectangle 1">
-            <a:extLst>
-              <a:ext uri="{FF2B5EF4-FFF2-40B4-BE49-F238E27FC236}">
-                <a16:creationId xmlns:a16="http://schemas.microsoft.com/office/drawing/2014/main" id="{A8B983FF-3A6B-4D2F-AA17-2215B8F850E9}"/>
-              </a:ext>
-            </a:extLst>
-          </p:cNvPr>
-          <p:cNvSpPr/>
-          <p:nvPr/>
-        </p:nvSpPr>
-        <p:spPr>
-          <a:xfrm>
-            <a:off x="6834066" y="4625162"/>
-            <a:ext cx="1267943" cy="307777"/>
-          </a:xfrm>
-          <a:prstGeom prst="rect">
-            <a:avLst/>
-          </a:prstGeom>
-        </p:spPr>
-        <p:txBody>
-          <a:bodyPr wrap="square">
-            <a:spAutoFit/>
-          </a:bodyPr>
-          <a:lstStyle/>
-          <a:p>
-            <a:r>
-              <a:rPr lang="en" dirty="0">
-                <a:latin typeface="Times New Roman" panose="02020603050405020304" pitchFamily="18" charset="0"/>
-                <a:cs typeface="Times New Roman" panose="02020603050405020304" pitchFamily="18" charset="0"/>
-              </a:rPr>
-              <a:t>Yas</a:t>
-            </a:r>
-            <a:r>
-              <a:rPr lang="en-US" dirty="0" err="1">
-                <a:latin typeface="Times New Roman" panose="02020603050405020304" pitchFamily="18" charset="0"/>
-                <a:cs typeface="Times New Roman" panose="02020603050405020304" pitchFamily="18" charset="0"/>
-              </a:rPr>
-              <a:t>wanth</a:t>
-            </a:r>
-            <a:endParaRPr lang="en-US" dirty="0"/>
           </a:p>
         </p:txBody>
       </p:sp>
@@ -12145,15 +12193,6 @@
             </a:endParaRPr>
           </a:p>
           <a:p>
-            <a:pPr marL="457200" lvl="0" indent="0" algn="l" rtl="0">
-              <a:spcBef>
-                <a:spcPts val="1600"/>
-              </a:spcBef>
-              <a:spcAft>
-                <a:spcPts val="1600"/>
-              </a:spcAft>
-              <a:buNone/>
-            </a:pPr>
             <a:r>
               <a:rPr lang="en-US" sz="1800" dirty="0">
                 <a:latin typeface="Times New Roman"/>
@@ -12164,19 +12203,19 @@
               <a:t>													</a:t>
             </a:r>
             <a:r>
-              <a:rPr lang="en-US" sz="1800" dirty="0" err="1">
-                <a:latin typeface="Times New Roman"/>
-                <a:ea typeface="Times New Roman"/>
-                <a:cs typeface="Times New Roman"/>
-                <a:sym typeface="Times New Roman"/>
+              <a:rPr lang="en" sz="1800" dirty="0">
+                <a:solidFill>
+                  <a:schemeClr val="bg1"/>
+                </a:solidFill>
+                <a:latin typeface="Times New Roman" panose="02020603050405020304" pitchFamily="18" charset="0"/>
+                <a:cs typeface="Times New Roman" panose="02020603050405020304" pitchFamily="18" charset="0"/>
               </a:rPr>
-              <a:t>Yaswanth</a:t>
+              <a:t>DurgaPrasadVSM</a:t>
             </a:r>
-            <a:endParaRPr sz="1800" dirty="0">
-              <a:latin typeface="Times New Roman"/>
-              <a:ea typeface="Times New Roman"/>
-              <a:cs typeface="Times New Roman"/>
-              <a:sym typeface="Times New Roman"/>
+            <a:endParaRPr lang="en-US" sz="1800" dirty="0">
+              <a:solidFill>
+                <a:schemeClr val="bg1"/>
+              </a:solidFill>
             </a:endParaRPr>
           </a:p>
         </p:txBody>
@@ -13563,6 +13602,165 @@
   <p:cSld>
     <p:spTree>
       <p:nvGrpSpPr>
+        <p:cNvPr id="1" name="Shape 229"/>
+        <p:cNvGrpSpPr/>
+        <p:nvPr/>
+      </p:nvGrpSpPr>
+      <p:grpSpPr>
+        <a:xfrm>
+          <a:off x="0" y="0"/>
+          <a:ext cx="0" cy="0"/>
+          <a:chOff x="0" y="0"/>
+          <a:chExt cx="0" cy="0"/>
+        </a:xfrm>
+      </p:grpSpPr>
+      <p:sp>
+        <p:nvSpPr>
+          <p:cNvPr id="230" name="Google Shape;230;p28"/>
+          <p:cNvSpPr txBox="1">
+            <a:spLocks noGrp="1"/>
+          </p:cNvSpPr>
+          <p:nvPr>
+            <p:ph type="title"/>
+          </p:nvPr>
+        </p:nvSpPr>
+        <p:spPr>
+          <a:xfrm>
+            <a:off x="1297500" y="393750"/>
+            <a:ext cx="7038900" cy="914100"/>
+          </a:xfrm>
+          <a:prstGeom prst="rect">
+            <a:avLst/>
+          </a:prstGeom>
+        </p:spPr>
+        <p:txBody>
+          <a:bodyPr spcFirstLastPara="1" wrap="square" lIns="91425" tIns="91425" rIns="91425" bIns="91425" anchor="t" anchorCtr="0">
+            <a:noAutofit/>
+          </a:bodyPr>
+          <a:lstStyle/>
+          <a:p>
+            <a:pPr marL="0" lvl="0" indent="0" algn="l" rtl="0">
+              <a:spcBef>
+                <a:spcPts val="0"/>
+              </a:spcBef>
+              <a:spcAft>
+                <a:spcPts val="0"/>
+              </a:spcAft>
+              <a:buNone/>
+            </a:pPr>
+            <a:r>
+              <a:rPr lang="en"/>
+              <a:t>Splunk Architecture</a:t>
+            </a:r>
+            <a:endParaRPr/>
+          </a:p>
+        </p:txBody>
+      </p:sp>
+      <p:pic>
+        <p:nvPicPr>
+          <p:cNvPr id="231" name="Google Shape;231;p28"/>
+          <p:cNvPicPr preferRelativeResize="0"/>
+          <p:nvPr/>
+        </p:nvPicPr>
+        <p:blipFill rotWithShape="1">
+          <a:blip r:embed="rId3">
+            <a:alphaModFix/>
+          </a:blip>
+          <a:srcRect r="2534" b="7902"/>
+          <a:stretch/>
+        </p:blipFill>
+        <p:spPr>
+          <a:xfrm>
+            <a:off x="1297500" y="938435"/>
+            <a:ext cx="7445700" cy="3686727"/>
+          </a:xfrm>
+          <a:prstGeom prst="rect">
+            <a:avLst/>
+          </a:prstGeom>
+          <a:noFill/>
+          <a:ln>
+            <a:noFill/>
+          </a:ln>
+        </p:spPr>
+      </p:pic>
+      <p:sp>
+        <p:nvSpPr>
+          <p:cNvPr id="2" name="Rectangle 1">
+            <a:extLst>
+              <a:ext uri="{FF2B5EF4-FFF2-40B4-BE49-F238E27FC236}">
+                <a16:creationId xmlns:a16="http://schemas.microsoft.com/office/drawing/2014/main" id="{A8B983FF-3A6B-4D2F-AA17-2215B8F850E9}"/>
+              </a:ext>
+            </a:extLst>
+          </p:cNvPr>
+          <p:cNvSpPr/>
+          <p:nvPr/>
+        </p:nvSpPr>
+        <p:spPr>
+          <a:xfrm>
+            <a:off x="6834066" y="4625162"/>
+            <a:ext cx="1637272" cy="307777"/>
+          </a:xfrm>
+          <a:prstGeom prst="rect">
+            <a:avLst/>
+          </a:prstGeom>
+        </p:spPr>
+        <p:txBody>
+          <a:bodyPr wrap="square">
+            <a:spAutoFit/>
+          </a:bodyPr>
+          <a:lstStyle/>
+          <a:p>
+            <a:r>
+              <a:rPr lang="en" dirty="0" smtClean="0">
+                <a:solidFill>
+                  <a:schemeClr val="bg1"/>
+                </a:solidFill>
+                <a:latin typeface="Times New Roman" panose="02020603050405020304" pitchFamily="18" charset="0"/>
+                <a:cs typeface="Times New Roman" panose="02020603050405020304" pitchFamily="18" charset="0"/>
+              </a:rPr>
+              <a:t>Yas</a:t>
+            </a:r>
+            <a:r>
+              <a:rPr lang="en-US" dirty="0" err="1" smtClean="0">
+                <a:solidFill>
+                  <a:schemeClr val="bg1"/>
+                </a:solidFill>
+                <a:latin typeface="Times New Roman" panose="02020603050405020304" pitchFamily="18" charset="0"/>
+                <a:cs typeface="Times New Roman" panose="02020603050405020304" pitchFamily="18" charset="0"/>
+              </a:rPr>
+              <a:t>wanth</a:t>
+            </a:r>
+            <a:r>
+              <a:rPr lang="en-US" dirty="0" smtClean="0">
+                <a:solidFill>
+                  <a:schemeClr val="bg1"/>
+                </a:solidFill>
+                <a:latin typeface="Times New Roman" panose="02020603050405020304" pitchFamily="18" charset="0"/>
+                <a:cs typeface="Times New Roman" panose="02020603050405020304" pitchFamily="18" charset="0"/>
+              </a:rPr>
+              <a:t> Yarram</a:t>
+            </a:r>
+            <a:endParaRPr lang="en-US" dirty="0">
+              <a:solidFill>
+                <a:schemeClr val="bg1"/>
+              </a:solidFill>
+            </a:endParaRPr>
+          </a:p>
+        </p:txBody>
+      </p:sp>
+    </p:spTree>
+  </p:cSld>
+  <p:clrMapOvr>
+    <a:masterClrMapping/>
+  </p:clrMapOvr>
+</p:sld>
+</file>
+
+<file path=ppt/slides/slide7.xml><?xml version="1.0" encoding="utf-8"?>
+<p:sld xmlns:a="http://schemas.openxmlformats.org/drawingml/2006/main" xmlns:r="http://schemas.openxmlformats.org/officeDocument/2006/relationships" xmlns:p="http://schemas.openxmlformats.org/presentationml/2006/main">
+  <p:cSld>
+    <p:spTree>
+      <p:nvGrpSpPr>
         <p:cNvPr id="1" name="Shape 174"/>
         <p:cNvGrpSpPr/>
         <p:nvPr/>
@@ -13756,24 +13954,45 @@
             <a:endParaRPr dirty="0"/>
           </a:p>
           <a:p>
-            <a:pPr marL="0" lvl="0" indent="0">
-              <a:spcBef>
-                <a:spcPts val="1600"/>
-              </a:spcBef>
-              <a:buNone/>
-            </a:pPr>
             <a:r>
               <a:rPr lang="en-US" dirty="0"/>
               <a:t>						</a:t>
             </a:r>
             <a:r>
               <a:rPr lang="en" sz="1400" dirty="0">
+                <a:solidFill>
+                  <a:schemeClr val="bg1"/>
+                </a:solidFill>
                 <a:latin typeface="Times New Roman" panose="02020603050405020304" pitchFamily="18" charset="0"/>
                 <a:cs typeface="Times New Roman" panose="02020603050405020304" pitchFamily="18" charset="0"/>
               </a:rPr>
-              <a:t> DurgaPrasadVSM</a:t>
+              <a:t>Yas</a:t>
             </a:r>
-            <a:endParaRPr dirty="0"/>
+            <a:r>
+              <a:rPr lang="en-US" sz="1400" dirty="0" err="1">
+                <a:solidFill>
+                  <a:schemeClr val="bg1"/>
+                </a:solidFill>
+                <a:latin typeface="Times New Roman" panose="02020603050405020304" pitchFamily="18" charset="0"/>
+                <a:cs typeface="Times New Roman" panose="02020603050405020304" pitchFamily="18" charset="0"/>
+              </a:rPr>
+              <a:t>wanth</a:t>
+            </a:r>
+            <a:r>
+              <a:rPr lang="en-US" sz="1400" dirty="0">
+                <a:solidFill>
+                  <a:schemeClr val="bg1"/>
+                </a:solidFill>
+                <a:latin typeface="Times New Roman" panose="02020603050405020304" pitchFamily="18" charset="0"/>
+                <a:cs typeface="Times New Roman" panose="02020603050405020304" pitchFamily="18" charset="0"/>
+              </a:rPr>
+              <a:t> Yarram</a:t>
+            </a:r>
+            <a:endParaRPr lang="en-US" sz="1400" dirty="0">
+              <a:solidFill>
+                <a:schemeClr val="bg1"/>
+              </a:solidFill>
+            </a:endParaRPr>
           </a:p>
           <a:p>
             <a:pPr marL="0" lvl="0" indent="0" algn="l" rtl="0">
@@ -13821,7 +14040,7 @@
 </p:sld>
 </file>
 
-<file path=ppt/slides/slide7.xml><?xml version="1.0" encoding="utf-8"?>
+<file path=ppt/slides/slide8.xml><?xml version="1.0" encoding="utf-8"?>
 <p:sld xmlns:a="http://schemas.openxmlformats.org/drawingml/2006/main" xmlns:r="http://schemas.openxmlformats.org/officeDocument/2006/relationships" xmlns:p="http://schemas.openxmlformats.org/presentationml/2006/main">
   <p:cSld>
     <p:spTree>
@@ -14006,15 +14225,6 @@
             </a:endParaRPr>
           </a:p>
           <a:p>
-            <a:pPr marL="0" indent="0">
-              <a:spcBef>
-                <a:spcPts val="1600"/>
-              </a:spcBef>
-              <a:spcAft>
-                <a:spcPts val="1600"/>
-              </a:spcAft>
-              <a:buNone/>
-            </a:pPr>
             <a:r>
               <a:rPr lang="en-US" sz="1400" dirty="0">
                 <a:latin typeface="Times New Roman" panose="02020603050405020304" pitchFamily="18" charset="0"/>
@@ -14023,13 +14233,40 @@
               <a:t>						</a:t>
             </a:r>
             <a:r>
-              <a:rPr lang="en-US" sz="1400" dirty="0" err="1">
+              <a:rPr lang="en" sz="1400" dirty="0">
+                <a:solidFill>
+                  <a:schemeClr val="bg1"/>
+                </a:solidFill>
                 <a:latin typeface="Times New Roman" panose="02020603050405020304" pitchFamily="18" charset="0"/>
                 <a:cs typeface="Times New Roman" panose="02020603050405020304" pitchFamily="18" charset="0"/>
               </a:rPr>
-              <a:t>DurgaPrasadVSM</a:t>
+              <a:t>Yas</a:t>
             </a:r>
-            <a:endParaRPr lang="en-US" sz="1400" dirty="0"/>
+            <a:r>
+              <a:rPr lang="en-US" sz="1400" dirty="0" err="1">
+                <a:solidFill>
+                  <a:schemeClr val="bg1"/>
+                </a:solidFill>
+                <a:latin typeface="Times New Roman" panose="02020603050405020304" pitchFamily="18" charset="0"/>
+                <a:cs typeface="Times New Roman" panose="02020603050405020304" pitchFamily="18" charset="0"/>
+              </a:rPr>
+              <a:t>wanth</a:t>
+            </a:r>
+            <a:r>
+              <a:rPr lang="en-US" sz="1400" dirty="0">
+                <a:solidFill>
+                  <a:schemeClr val="bg1"/>
+                </a:solidFill>
+                <a:latin typeface="Times New Roman" panose="02020603050405020304" pitchFamily="18" charset="0"/>
+                <a:cs typeface="Times New Roman" panose="02020603050405020304" pitchFamily="18" charset="0"/>
+              </a:rPr>
+              <a:t> Yarram</a:t>
+            </a:r>
+            <a:endParaRPr lang="en-US" sz="1400" dirty="0">
+              <a:solidFill>
+                <a:schemeClr val="bg1"/>
+              </a:solidFill>
+            </a:endParaRPr>
           </a:p>
           <a:p>
             <a:pPr marL="0" lvl="0" indent="0" algn="l" rtl="0">
@@ -14056,7 +14293,7 @@
 </p:sld>
 </file>
 
-<file path=ppt/slides/slide8.xml><?xml version="1.0" encoding="utf-8"?>
+<file path=ppt/slides/slide9.xml><?xml version="1.0" encoding="utf-8"?>
 <p:sld xmlns:a="http://schemas.openxmlformats.org/drawingml/2006/main" xmlns:r="http://schemas.openxmlformats.org/officeDocument/2006/relationships" xmlns:p="http://schemas.openxmlformats.org/presentationml/2006/main">
   <p:cSld>
     <p:spTree>
@@ -14269,36 +14506,76 @@
             </a:endParaRPr>
           </a:p>
           <a:p>
-            <a:pPr marL="0" lvl="0" indent="0">
-              <a:spcBef>
-                <a:spcPts val="1600"/>
-              </a:spcBef>
-              <a:spcAft>
-                <a:spcPts val="1600"/>
-              </a:spcAft>
-              <a:buNone/>
-            </a:pPr>
             <a:r>
-              <a:rPr lang="en" sz="1600" dirty="0">
+              <a:rPr lang="en" sz="1600" dirty="0" smtClean="0">
                 <a:latin typeface="Times New Roman"/>
                 <a:ea typeface="Times New Roman"/>
                 <a:cs typeface="Times New Roman"/>
                 <a:sym typeface="Times New Roman"/>
               </a:rPr>
-              <a:t>Splunk Light is a free version. It allows search, report and alter your log data. It has limited functionalities and feature compared to other versions.                                  </a:t>
+              <a:t>Splunk Light is a free version. It allows search, report and alter your log data. It has limited functionalities and feature compared to other versions. </a:t>
+            </a:r>
+          </a:p>
+          <a:p>
+            <a:pPr marL="146050" indent="0">
+              <a:buNone/>
+            </a:pPr>
+            <a:r>
+              <a:rPr lang="en" sz="1600" dirty="0">
+                <a:solidFill>
+                  <a:schemeClr val="bg1"/>
+                </a:solidFill>
+                <a:latin typeface="Times New Roman"/>
+                <a:cs typeface="Times New Roman"/>
+                <a:sym typeface="Times New Roman"/>
+              </a:rPr>
+              <a:t> </a:t>
             </a:r>
             <a:r>
-              <a:rPr lang="en" sz="1600" dirty="0">
+              <a:rPr lang="en" sz="1600" dirty="0" smtClean="0">
+                <a:solidFill>
+                  <a:schemeClr val="bg1"/>
+                </a:solidFill>
+                <a:latin typeface="Times New Roman"/>
+                <a:cs typeface="Times New Roman"/>
+                <a:sym typeface="Times New Roman"/>
+              </a:rPr>
+              <a:t>                                                                                                                      </a:t>
+            </a:r>
+            <a:r>
+              <a:rPr lang="en" sz="1600" dirty="0" smtClean="0">
+                <a:solidFill>
+                  <a:schemeClr val="bg1"/>
+                </a:solidFill>
                 <a:latin typeface="Times New Roman" panose="02020603050405020304" pitchFamily="18" charset="0"/>
                 <a:cs typeface="Times New Roman" panose="02020603050405020304" pitchFamily="18" charset="0"/>
               </a:rPr>
-              <a:t>DurgaPrasadVSM</a:t>
+              <a:t>Yas</a:t>
             </a:r>
-            <a:endParaRPr lang="en" sz="1600" dirty="0">
-              <a:latin typeface="Times New Roman"/>
-              <a:ea typeface="Times New Roman"/>
-              <a:cs typeface="Times New Roman"/>
-              <a:sym typeface="Times New Roman"/>
+            <a:r>
+              <a:rPr lang="en-US" sz="1600" dirty="0" err="1">
+                <a:solidFill>
+                  <a:schemeClr val="bg1"/>
+                </a:solidFill>
+                <a:latin typeface="Times New Roman" panose="02020603050405020304" pitchFamily="18" charset="0"/>
+                <a:cs typeface="Times New Roman" panose="02020603050405020304" pitchFamily="18" charset="0"/>
+              </a:rPr>
+              <a:t>wanth</a:t>
+            </a:r>
+            <a:r>
+              <a:rPr lang="en-US" sz="1600" dirty="0">
+                <a:solidFill>
+                  <a:schemeClr val="bg1"/>
+                </a:solidFill>
+                <a:latin typeface="Times New Roman" panose="02020603050405020304" pitchFamily="18" charset="0"/>
+                <a:cs typeface="Times New Roman" panose="02020603050405020304" pitchFamily="18" charset="0"/>
+              </a:rPr>
+              <a:t> Yarram</a:t>
+            </a:r>
+            <a:endParaRPr lang="en-US" sz="1600" dirty="0">
+              <a:solidFill>
+                <a:schemeClr val="bg1"/>
+              </a:solidFill>
             </a:endParaRPr>
           </a:p>
           <a:p>
@@ -14317,186 +14594,6 @@
               <a:cs typeface="Times New Roman"/>
               <a:sym typeface="Times New Roman"/>
             </a:endParaRPr>
-          </a:p>
-        </p:txBody>
-      </p:sp>
-    </p:spTree>
-  </p:cSld>
-  <p:clrMapOvr>
-    <a:masterClrMapping/>
-  </p:clrMapOvr>
-</p:sld>
-</file>
-
-<file path=ppt/slides/slide9.xml><?xml version="1.0" encoding="utf-8"?>
-<p:sld xmlns:a="http://schemas.openxmlformats.org/drawingml/2006/main" xmlns:r="http://schemas.openxmlformats.org/officeDocument/2006/relationships" xmlns:p="http://schemas.openxmlformats.org/presentationml/2006/main">
-  <p:cSld>
-    <p:spTree>
-      <p:nvGrpSpPr>
-        <p:cNvPr id="1" name="Shape 192"/>
-        <p:cNvGrpSpPr/>
-        <p:nvPr/>
-      </p:nvGrpSpPr>
-      <p:grpSpPr>
-        <a:xfrm>
-          <a:off x="0" y="0"/>
-          <a:ext cx="0" cy="0"/>
-          <a:chOff x="0" y="0"/>
-          <a:chExt cx="0" cy="0"/>
-        </a:xfrm>
-      </p:grpSpPr>
-      <p:sp>
-        <p:nvSpPr>
-          <p:cNvPr id="193" name="Google Shape;193;p22"/>
-          <p:cNvSpPr txBox="1">
-            <a:spLocks noGrp="1"/>
-          </p:cNvSpPr>
-          <p:nvPr>
-            <p:ph type="title"/>
-          </p:nvPr>
-        </p:nvSpPr>
-        <p:spPr>
-          <a:xfrm>
-            <a:off x="1297500" y="393750"/>
-            <a:ext cx="7038900" cy="914100"/>
-          </a:xfrm>
-          <a:prstGeom prst="rect">
-            <a:avLst/>
-          </a:prstGeom>
-        </p:spPr>
-        <p:txBody>
-          <a:bodyPr spcFirstLastPara="1" wrap="square" lIns="91425" tIns="91425" rIns="91425" bIns="91425" anchor="t" anchorCtr="0">
-            <a:noAutofit/>
-          </a:bodyPr>
-          <a:lstStyle/>
-          <a:p>
-            <a:pPr marL="0" lvl="0" indent="0" algn="l" rtl="0">
-              <a:spcBef>
-                <a:spcPts val="0"/>
-              </a:spcBef>
-              <a:spcAft>
-                <a:spcPts val="0"/>
-              </a:spcAft>
-              <a:buNone/>
-            </a:pPr>
-            <a:r>
-              <a:rPr lang="en" dirty="0">
-                <a:latin typeface="Times New Roman" panose="02020603050405020304" pitchFamily="18" charset="0"/>
-                <a:cs typeface="Times New Roman" panose="02020603050405020304" pitchFamily="18" charset="0"/>
-              </a:rPr>
-              <a:t>How splunk Works?</a:t>
-            </a:r>
-            <a:endParaRPr dirty="0">
-              <a:latin typeface="Times New Roman" panose="02020603050405020304" pitchFamily="18" charset="0"/>
-              <a:cs typeface="Times New Roman" panose="02020603050405020304" pitchFamily="18" charset="0"/>
-            </a:endParaRPr>
-          </a:p>
-        </p:txBody>
-      </p:sp>
-      <p:sp>
-        <p:nvSpPr>
-          <p:cNvPr id="194" name="Google Shape;194;p22"/>
-          <p:cNvSpPr txBox="1">
-            <a:spLocks noGrp="1"/>
-          </p:cNvSpPr>
-          <p:nvPr>
-            <p:ph type="body" idx="1"/>
-          </p:nvPr>
-        </p:nvSpPr>
-        <p:spPr>
-          <a:xfrm>
-            <a:off x="1297499" y="1567549"/>
-            <a:ext cx="7336137" cy="3397855"/>
-          </a:xfrm>
-          <a:prstGeom prst="rect">
-            <a:avLst/>
-          </a:prstGeom>
-        </p:spPr>
-        <p:txBody>
-          <a:bodyPr spcFirstLastPara="1" wrap="square" lIns="91425" tIns="91425" rIns="91425" bIns="91425" anchor="t" anchorCtr="0">
-            <a:noAutofit/>
-          </a:bodyPr>
-          <a:lstStyle/>
-          <a:p>
-            <a:pPr marL="0" lvl="0" indent="0" algn="l" rtl="0">
-              <a:spcBef>
-                <a:spcPts val="0"/>
-              </a:spcBef>
-              <a:spcAft>
-                <a:spcPts val="1600"/>
-              </a:spcAft>
-              <a:buNone/>
-            </a:pPr>
-            <a:endParaRPr dirty="0">
-              <a:latin typeface="Times New Roman" panose="02020603050405020304" pitchFamily="18" charset="0"/>
-              <a:cs typeface="Times New Roman" panose="02020603050405020304" pitchFamily="18" charset="0"/>
-            </a:endParaRPr>
-          </a:p>
-        </p:txBody>
-      </p:sp>
-      <p:pic>
-        <p:nvPicPr>
-          <p:cNvPr id="195" name="Google Shape;195;p22"/>
-          <p:cNvPicPr preferRelativeResize="0"/>
-          <p:nvPr/>
-        </p:nvPicPr>
-        <p:blipFill>
-          <a:blip r:embed="rId3">
-            <a:alphaModFix/>
-          </a:blip>
-          <a:stretch>
-            <a:fillRect/>
-          </a:stretch>
-        </p:blipFill>
-        <p:spPr>
-          <a:xfrm>
-            <a:off x="1297499" y="1567549"/>
-            <a:ext cx="6878937" cy="2664208"/>
-          </a:xfrm>
-          <a:prstGeom prst="rect">
-            <a:avLst/>
-          </a:prstGeom>
-          <a:noFill/>
-          <a:ln>
-            <a:noFill/>
-          </a:ln>
-        </p:spPr>
-      </p:pic>
-      <p:sp>
-        <p:nvSpPr>
-          <p:cNvPr id="2" name="Rectangle 1">
-            <a:extLst>
-              <a:ext uri="{FF2B5EF4-FFF2-40B4-BE49-F238E27FC236}">
-                <a16:creationId xmlns:a16="http://schemas.microsoft.com/office/drawing/2014/main" id="{59EB8D04-1B9B-47B0-B0B9-06637FFA2881}"/>
-              </a:ext>
-            </a:extLst>
-          </p:cNvPr>
-          <p:cNvSpPr/>
-          <p:nvPr/>
-        </p:nvSpPr>
-        <p:spPr>
-          <a:xfrm>
-            <a:off x="6834066" y="4595861"/>
-            <a:ext cx="1502334" cy="307777"/>
-          </a:xfrm>
-          <a:prstGeom prst="rect">
-            <a:avLst/>
-          </a:prstGeom>
-        </p:spPr>
-        <p:txBody>
-          <a:bodyPr wrap="none">
-            <a:spAutoFit/>
-          </a:bodyPr>
-          <a:lstStyle/>
-          <a:p>
-            <a:r>
-              <a:rPr lang="en" dirty="0">
-                <a:latin typeface="Times New Roman" panose="02020603050405020304" pitchFamily="18" charset="0"/>
-                <a:cs typeface="Times New Roman" panose="02020603050405020304" pitchFamily="18" charset="0"/>
-              </a:rPr>
-              <a:t>DurgaPrasadVSM</a:t>
-            </a:r>
-            <a:endParaRPr lang="en-US" dirty="0"/>
           </a:p>
         </p:txBody>
       </p:sp>

</xml_diff>

<commit_message>
Updated slides with Page alienation and Formatting
</commit_message>
<xml_diff>
--- a/docs/Splunk.pptx
+++ b/docs/Splunk.pptx
@@ -31,14 +31,14 @@
   <p:notesSz cx="6858000" cy="9144000"/>
   <p:embeddedFontLst>
     <p:embeddedFont>
-      <p:font typeface="Lato" panose="020B0604020202020204" charset="0"/>
+      <p:font typeface="Montserrat" panose="020B0604020202020204" charset="0"/>
       <p:regular r:id="rId21"/>
       <p:bold r:id="rId22"/>
       <p:italic r:id="rId23"/>
       <p:boldItalic r:id="rId24"/>
     </p:embeddedFont>
     <p:embeddedFont>
-      <p:font typeface="Montserrat" panose="020B0604020202020204" charset="0"/>
+      <p:font typeface="Lato" panose="020B0604020202020204" charset="0"/>
       <p:regular r:id="rId25"/>
       <p:bold r:id="rId26"/>
       <p:italic r:id="rId27"/>
@@ -770,8 +770,8 @@
         </p:nvSpPr>
         <p:spPr>
           <a:xfrm>
-            <a:off x="381300" y="685800"/>
-            <a:ext cx="6096075" cy="3429000"/>
+            <a:off x="381000" y="685800"/>
+            <a:ext cx="6096000" cy="3429000"/>
           </a:xfrm>
           <a:custGeom>
             <a:avLst/>
@@ -1602,7 +1602,7 @@
         </p:nvSpPr>
         <p:spPr>
           <a:xfrm>
-            <a:off x="381300" y="685800"/>
+            <a:off x="381000" y="685800"/>
             <a:ext cx="6096000" cy="3429000"/>
           </a:xfrm>
           <a:custGeom>
@@ -10120,7 +10120,7 @@
     <p:sldLayoutId id="2147483657" r:id="rId10"/>
     <p:sldLayoutId id="2147483658" r:id="rId11"/>
   </p:sldLayoutIdLst>
-  <p:hf sldNum="0" hdr="0" ftr="0" dt="0"/>
+  <p:hf hdr="0" dt="0"/>
   <p:txStyles>
     <p:titleStyle>
       <a:defPPr marR="0" lvl="0" algn="l" rtl="0">
@@ -10896,6 +10896,38 @@
           </a:ln>
         </p:spPr>
       </p:pic>
+      <p:sp>
+        <p:nvSpPr>
+          <p:cNvPr id="2" name="Slide Number Placeholder 1"/>
+          <p:cNvSpPr>
+            <a:spLocks noGrp="1"/>
+          </p:cNvSpPr>
+          <p:nvPr>
+            <p:ph type="sldNum" idx="12"/>
+          </p:nvPr>
+        </p:nvSpPr>
+        <p:spPr/>
+        <p:txBody>
+          <a:bodyPr/>
+          <a:lstStyle/>
+          <a:p>
+            <a:pPr marL="0" lvl="0" indent="0" algn="r" rtl="0">
+              <a:spcBef>
+                <a:spcPts val="0"/>
+              </a:spcBef>
+              <a:spcAft>
+                <a:spcPts val="0"/>
+              </a:spcAft>
+              <a:buNone/>
+            </a:pPr>
+            <a:fld id="{00000000-1234-1234-1234-123412341234}" type="slidenum">
+              <a:rPr lang="en" smtClean="0"/>
+              <a:t>1</a:t>
+            </a:fld>
+            <a:endParaRPr lang="en"/>
+          </a:p>
+        </p:txBody>
+      </p:sp>
     </p:spTree>
   </p:cSld>
   <p:clrMapOvr>
@@ -10996,13 +11028,13 @@
           <a:p>
             <a:pPr marL="342900" indent="-342900"/>
             <a:r>
-              <a:rPr lang="en" sz="2000" dirty="0">
+              <a:rPr lang="en" sz="1600" dirty="0">
                 <a:latin typeface="Times New Roman" panose="02020603050405020304" pitchFamily="18" charset="0"/>
                 <a:cs typeface="Times New Roman" panose="02020603050405020304" pitchFamily="18" charset="0"/>
               </a:rPr>
               <a:t>Splunk Enterprise</a:t>
             </a:r>
-            <a:endParaRPr sz="2000" dirty="0">
+            <a:endParaRPr sz="1600" dirty="0">
               <a:latin typeface="Times New Roman" panose="02020603050405020304" pitchFamily="18" charset="0"/>
               <a:cs typeface="Times New Roman" panose="02020603050405020304" pitchFamily="18" charset="0"/>
             </a:endParaRPr>
@@ -11014,13 +11046,13 @@
               </a:spcBef>
             </a:pPr>
             <a:r>
-              <a:rPr lang="en" sz="2000" dirty="0">
+              <a:rPr lang="en" sz="1600" dirty="0">
                 <a:latin typeface="Times New Roman" panose="02020603050405020304" pitchFamily="18" charset="0"/>
                 <a:cs typeface="Times New Roman" panose="02020603050405020304" pitchFamily="18" charset="0"/>
               </a:rPr>
               <a:t>Splunk Light</a:t>
             </a:r>
-            <a:endParaRPr sz="2000" dirty="0">
+            <a:endParaRPr sz="1600" dirty="0">
               <a:latin typeface="Times New Roman" panose="02020603050405020304" pitchFamily="18" charset="0"/>
               <a:cs typeface="Times New Roman" panose="02020603050405020304" pitchFamily="18" charset="0"/>
             </a:endParaRPr>
@@ -11032,13 +11064,13 @@
               </a:spcBef>
             </a:pPr>
             <a:r>
-              <a:rPr lang="en" sz="2000" dirty="0">
+              <a:rPr lang="en" sz="1600" dirty="0">
                 <a:latin typeface="Times New Roman" panose="02020603050405020304" pitchFamily="18" charset="0"/>
                 <a:cs typeface="Times New Roman" panose="02020603050405020304" pitchFamily="18" charset="0"/>
               </a:rPr>
               <a:t>Splunk Cloud</a:t>
             </a:r>
-            <a:endParaRPr sz="2000" dirty="0">
+            <a:endParaRPr sz="1600" dirty="0">
               <a:latin typeface="Times New Roman" panose="02020603050405020304" pitchFamily="18" charset="0"/>
               <a:cs typeface="Times New Roman" panose="02020603050405020304" pitchFamily="18" charset="0"/>
             </a:endParaRPr>
@@ -11126,6 +11158,38 @@
               <a:latin typeface="Times New Roman" panose="02020603050405020304" pitchFamily="18" charset="0"/>
               <a:cs typeface="Times New Roman" panose="02020603050405020304" pitchFamily="18" charset="0"/>
             </a:endParaRPr>
+          </a:p>
+        </p:txBody>
+      </p:sp>
+      <p:sp>
+        <p:nvSpPr>
+          <p:cNvPr id="2" name="Slide Number Placeholder 1"/>
+          <p:cNvSpPr>
+            <a:spLocks noGrp="1"/>
+          </p:cNvSpPr>
+          <p:nvPr>
+            <p:ph type="sldNum" idx="12"/>
+          </p:nvPr>
+        </p:nvSpPr>
+        <p:spPr/>
+        <p:txBody>
+          <a:bodyPr/>
+          <a:lstStyle/>
+          <a:p>
+            <a:pPr marL="0" lvl="0" indent="0" algn="r" rtl="0">
+              <a:spcBef>
+                <a:spcPts val="0"/>
+              </a:spcBef>
+              <a:spcAft>
+                <a:spcPts val="0"/>
+              </a:spcAft>
+              <a:buNone/>
+            </a:pPr>
+            <a:fld id="{00000000-1234-1234-1234-123412341234}" type="slidenum">
+              <a:rPr lang="en" smtClean="0"/>
+              <a:t>10</a:t>
+            </a:fld>
+            <a:endParaRPr lang="en"/>
           </a:p>
         </p:txBody>
       </p:sp>
@@ -11227,11 +11291,10 @@
           </a:bodyPr>
           <a:lstStyle/>
           <a:p>
-            <a:pPr marL="0" lvl="0" indent="0">
+            <a:pPr marL="285750" indent="-285750">
               <a:spcBef>
                 <a:spcPts val="1600"/>
               </a:spcBef>
-              <a:buNone/>
             </a:pPr>
             <a:r>
               <a:rPr lang="en-US" sz="1600" b="1" dirty="0">
@@ -11244,12 +11307,21 @@
             </a:r>
           </a:p>
           <a:p>
-            <a:pPr marL="0" lvl="0" indent="0">
+            <a:pPr marL="0" indent="0">
               <a:spcBef>
                 <a:spcPts val="1600"/>
               </a:spcBef>
               <a:buNone/>
             </a:pPr>
+            <a:r>
+              <a:rPr lang="en-US" sz="1600" dirty="0" smtClean="0">
+                <a:latin typeface="Times New Roman" panose="02020603050405020304" pitchFamily="18" charset="0"/>
+                <a:ea typeface="Times New Roman"/>
+                <a:cs typeface="Times New Roman" panose="02020603050405020304" pitchFamily="18" charset="0"/>
+                <a:sym typeface="Times New Roman"/>
+              </a:rPr>
+              <a:t>          The </a:t>
+            </a:r>
             <a:r>
               <a:rPr lang="en-US" sz="1600" dirty="0">
                 <a:latin typeface="Times New Roman" panose="02020603050405020304" pitchFamily="18" charset="0"/>
@@ -11257,13 +11329,11 @@
                 <a:cs typeface="Times New Roman" panose="02020603050405020304" pitchFamily="18" charset="0"/>
                 <a:sym typeface="Times New Roman"/>
               </a:rPr>
-              <a:t>The large IT company uses Splunk Enterprise Edition. It helps you to collect and analysis information apps , websites ,applications, etc.</a:t>
+              <a:t>large IT company uses Splunk Enterprise Edition. It helps you to collect and analysis information apps , websites ,applications, etc.</a:t>
             </a:r>
           </a:p>
           <a:p>
-            <a:pPr marL="0" lvl="0" indent="0">
-              <a:buNone/>
-            </a:pPr>
+            <a:pPr marL="285750" indent="-285750"/>
             <a:endParaRPr lang="en-US" sz="1600" b="1" dirty="0">
               <a:latin typeface="Times New Roman" panose="02020603050405020304" pitchFamily="18" charset="0"/>
               <a:ea typeface="Times New Roman"/>
@@ -11272,15 +11342,7 @@
             </a:endParaRPr>
           </a:p>
           <a:p>
-            <a:pPr marL="0" lvl="0" indent="0" algn="l" rtl="0">
-              <a:spcBef>
-                <a:spcPts val="0"/>
-              </a:spcBef>
-              <a:spcAft>
-                <a:spcPts val="0"/>
-              </a:spcAft>
-              <a:buNone/>
-            </a:pPr>
+            <a:pPr marL="285750" indent="-285750"/>
             <a:r>
               <a:rPr lang="en" sz="1600" b="1" dirty="0">
                 <a:latin typeface="Times New Roman"/>
@@ -11298,15 +11360,21 @@
             </a:endParaRPr>
           </a:p>
           <a:p>
-            <a:pPr marL="0" lvl="0" indent="0" algn="l" rtl="0">
+            <a:pPr marL="0" indent="0">
               <a:spcBef>
                 <a:spcPts val="1600"/>
               </a:spcBef>
-              <a:spcAft>
-                <a:spcPts val="0"/>
-              </a:spcAft>
               <a:buNone/>
             </a:pPr>
+            <a:r>
+              <a:rPr lang="en" sz="1600" dirty="0" smtClean="0">
+                <a:latin typeface="Times New Roman"/>
+                <a:ea typeface="Times New Roman"/>
+                <a:cs typeface="Times New Roman"/>
+                <a:sym typeface="Times New Roman"/>
+              </a:rPr>
+              <a:t>         It </a:t>
+            </a:r>
             <a:r>
               <a:rPr lang="en" sz="1600" dirty="0">
                 <a:latin typeface="Times New Roman"/>
@@ -11314,7 +11382,7 @@
                 <a:cs typeface="Times New Roman"/>
                 <a:sym typeface="Times New Roman"/>
               </a:rPr>
-              <a:t>It has the same features as the enterprise version.Splunk Cloud is a hosted platform. It can be availed from AWS cloud platform or splunk</a:t>
+              <a:t>has the same features as the enterprise version.Splunk Cloud is a hosted platform. It can be availed from AWS cloud platform or splunk</a:t>
             </a:r>
             <a:endParaRPr sz="1600" dirty="0">
               <a:latin typeface="Times New Roman"/>
@@ -11324,14 +11392,10 @@
             </a:endParaRPr>
           </a:p>
           <a:p>
-            <a:pPr marL="0" lvl="0" indent="0" algn="l" rtl="0">
+            <a:pPr marL="285750" indent="-285750">
               <a:spcBef>
                 <a:spcPts val="1600"/>
               </a:spcBef>
-              <a:spcAft>
-                <a:spcPts val="0"/>
-              </a:spcAft>
-              <a:buNone/>
             </a:pPr>
             <a:r>
               <a:rPr lang="en" sz="1600" b="1" dirty="0">
@@ -11340,9 +11404,18 @@
                 <a:cs typeface="Times New Roman"/>
                 <a:sym typeface="Times New Roman"/>
               </a:rPr>
-              <a:t>Splunk Light:</a:t>
+              <a:t>Splunk </a:t>
             </a:r>
-            <a:endParaRPr sz="1600" b="1" dirty="0">
+            <a:r>
+              <a:rPr lang="en" sz="1600" b="1" dirty="0" smtClean="0">
+                <a:latin typeface="Times New Roman"/>
+                <a:ea typeface="Times New Roman"/>
+                <a:cs typeface="Times New Roman"/>
+                <a:sym typeface="Times New Roman"/>
+              </a:rPr>
+              <a:t>Light:</a:t>
+            </a:r>
+            <a:endParaRPr lang="en" sz="1600" b="1" dirty="0">
               <a:latin typeface="Times New Roman"/>
               <a:ea typeface="Times New Roman"/>
               <a:cs typeface="Times New Roman"/>
@@ -11350,6 +11423,12 @@
             </a:endParaRPr>
           </a:p>
           <a:p>
+            <a:pPr marL="0" indent="0">
+              <a:spcBef>
+                <a:spcPts val="1600"/>
+              </a:spcBef>
+              <a:buNone/>
+            </a:pPr>
             <a:r>
               <a:rPr lang="en" sz="1600" dirty="0" smtClean="0">
                 <a:latin typeface="Times New Roman"/>
@@ -11357,7 +11436,7 @@
                 <a:cs typeface="Times New Roman"/>
                 <a:sym typeface="Times New Roman"/>
               </a:rPr>
-              <a:t>Splunk Light is a free version. It allows search, report and alter your log data. It has limited functionalities and feature compared to other versions. </a:t>
+              <a:t>      Splunk Light is a free version. It allows search, report and alter your log data. It has limited functionalities and feature compared to other versions. </a:t>
             </a:r>
           </a:p>
           <a:p>
@@ -11415,6 +11494,38 @@
               <a:cs typeface="Times New Roman"/>
               <a:sym typeface="Times New Roman"/>
             </a:endParaRPr>
+          </a:p>
+        </p:txBody>
+      </p:sp>
+      <p:sp>
+        <p:nvSpPr>
+          <p:cNvPr id="2" name="Slide Number Placeholder 1"/>
+          <p:cNvSpPr>
+            <a:spLocks noGrp="1"/>
+          </p:cNvSpPr>
+          <p:nvPr>
+            <p:ph type="sldNum" idx="12"/>
+          </p:nvPr>
+        </p:nvSpPr>
+        <p:spPr/>
+        <p:txBody>
+          <a:bodyPr/>
+          <a:lstStyle/>
+          <a:p>
+            <a:pPr marL="0" lvl="0" indent="0" algn="r" rtl="0">
+              <a:spcBef>
+                <a:spcPts val="0"/>
+              </a:spcBef>
+              <a:spcAft>
+                <a:spcPts val="0"/>
+              </a:spcAft>
+              <a:buNone/>
+            </a:pPr>
+            <a:fld id="{00000000-1234-1234-1234-123412341234}" type="slidenum">
+              <a:rPr lang="en" smtClean="0"/>
+              <a:t>11</a:t>
+            </a:fld>
+            <a:endParaRPr lang="en"/>
           </a:p>
         </p:txBody>
       </p:sp>
@@ -11626,6 +11737,38 @@
           </a:p>
         </p:txBody>
       </p:sp>
+      <p:sp>
+        <p:nvSpPr>
+          <p:cNvPr id="2" name="Slide Number Placeholder 1"/>
+          <p:cNvSpPr>
+            <a:spLocks noGrp="1"/>
+          </p:cNvSpPr>
+          <p:nvPr>
+            <p:ph type="sldNum" idx="12"/>
+          </p:nvPr>
+        </p:nvSpPr>
+        <p:spPr/>
+        <p:txBody>
+          <a:bodyPr/>
+          <a:lstStyle/>
+          <a:p>
+            <a:pPr marL="0" lvl="0" indent="0" algn="r" rtl="0">
+              <a:spcBef>
+                <a:spcPts val="0"/>
+              </a:spcBef>
+              <a:spcAft>
+                <a:spcPts val="0"/>
+              </a:spcAft>
+              <a:buNone/>
+            </a:pPr>
+            <a:fld id="{00000000-1234-1234-1234-123412341234}" type="slidenum">
+              <a:rPr lang="en" smtClean="0"/>
+              <a:t>12</a:t>
+            </a:fld>
+            <a:endParaRPr lang="en"/>
+          </a:p>
+        </p:txBody>
+      </p:sp>
     </p:spTree>
   </p:cSld>
   <p:clrMapOvr>
@@ -11733,10 +11876,16 @@
           <a:p>
             <a:pPr marL="285750" indent="-285750"/>
             <a:r>
-              <a:rPr lang="en" sz="1800" dirty="0"/>
+              <a:rPr lang="en" sz="1600" dirty="0">
+                <a:latin typeface="Times New Roman" panose="02020603050405020304" pitchFamily="18" charset="0"/>
+                <a:cs typeface="Times New Roman" panose="02020603050405020304" pitchFamily="18" charset="0"/>
+              </a:rPr>
               <a:t>Cisco</a:t>
             </a:r>
-            <a:endParaRPr sz="1800" dirty="0"/>
+            <a:endParaRPr sz="1600" dirty="0">
+              <a:latin typeface="Times New Roman" panose="02020603050405020304" pitchFamily="18" charset="0"/>
+              <a:cs typeface="Times New Roman" panose="02020603050405020304" pitchFamily="18" charset="0"/>
+            </a:endParaRPr>
           </a:p>
           <a:p>
             <a:pPr marL="285750" indent="-285750">
@@ -11745,10 +11894,16 @@
               </a:spcBef>
             </a:pPr>
             <a:r>
-              <a:rPr lang="en" sz="1800" dirty="0"/>
+              <a:rPr lang="en" sz="1600" dirty="0">
+                <a:latin typeface="Times New Roman" panose="02020603050405020304" pitchFamily="18" charset="0"/>
+                <a:cs typeface="Times New Roman" panose="02020603050405020304" pitchFamily="18" charset="0"/>
+              </a:rPr>
               <a:t>Bosch</a:t>
             </a:r>
-            <a:endParaRPr sz="1800" dirty="0"/>
+            <a:endParaRPr sz="1600" dirty="0">
+              <a:latin typeface="Times New Roman" panose="02020603050405020304" pitchFamily="18" charset="0"/>
+              <a:cs typeface="Times New Roman" panose="02020603050405020304" pitchFamily="18" charset="0"/>
+            </a:endParaRPr>
           </a:p>
           <a:p>
             <a:pPr marL="285750" indent="-285750">
@@ -11757,10 +11912,16 @@
               </a:spcBef>
             </a:pPr>
             <a:r>
-              <a:rPr lang="en" sz="1800" dirty="0"/>
+              <a:rPr lang="en" sz="1600" dirty="0">
+                <a:latin typeface="Times New Roman" panose="02020603050405020304" pitchFamily="18" charset="0"/>
+                <a:cs typeface="Times New Roman" panose="02020603050405020304" pitchFamily="18" charset="0"/>
+              </a:rPr>
               <a:t>IBM</a:t>
             </a:r>
-            <a:endParaRPr sz="1800" dirty="0"/>
+            <a:endParaRPr sz="1600" dirty="0">
+              <a:latin typeface="Times New Roman" panose="02020603050405020304" pitchFamily="18" charset="0"/>
+              <a:cs typeface="Times New Roman" panose="02020603050405020304" pitchFamily="18" charset="0"/>
+            </a:endParaRPr>
           </a:p>
           <a:p>
             <a:pPr marL="285750" indent="-285750">
@@ -11769,10 +11930,16 @@
               </a:spcBef>
             </a:pPr>
             <a:r>
-              <a:rPr lang="en" sz="1800" dirty="0"/>
+              <a:rPr lang="en" sz="1600" dirty="0">
+                <a:latin typeface="Times New Roman" panose="02020603050405020304" pitchFamily="18" charset="0"/>
+                <a:cs typeface="Times New Roman" panose="02020603050405020304" pitchFamily="18" charset="0"/>
+              </a:rPr>
               <a:t>Motorola</a:t>
             </a:r>
-            <a:endParaRPr sz="1800" dirty="0"/>
+            <a:endParaRPr sz="1600" dirty="0">
+              <a:latin typeface="Times New Roman" panose="02020603050405020304" pitchFamily="18" charset="0"/>
+              <a:cs typeface="Times New Roman" panose="02020603050405020304" pitchFamily="18" charset="0"/>
+            </a:endParaRPr>
           </a:p>
           <a:p>
             <a:pPr marL="285750" indent="-285750">
@@ -11781,10 +11948,16 @@
               </a:spcBef>
             </a:pPr>
             <a:r>
-              <a:rPr lang="en" sz="1800" dirty="0"/>
+              <a:rPr lang="en" sz="1600" dirty="0">
+                <a:latin typeface="Times New Roman" panose="02020603050405020304" pitchFamily="18" charset="0"/>
+                <a:cs typeface="Times New Roman" panose="02020603050405020304" pitchFamily="18" charset="0"/>
+              </a:rPr>
               <a:t>PepsiCo</a:t>
             </a:r>
-            <a:endParaRPr sz="1800" dirty="0"/>
+            <a:endParaRPr sz="1600" dirty="0">
+              <a:latin typeface="Times New Roman" panose="02020603050405020304" pitchFamily="18" charset="0"/>
+              <a:cs typeface="Times New Roman" panose="02020603050405020304" pitchFamily="18" charset="0"/>
+            </a:endParaRPr>
           </a:p>
           <a:p>
             <a:pPr marL="285750" indent="-285750">
@@ -11793,7 +11966,10 @@
               </a:spcBef>
             </a:pPr>
             <a:r>
-              <a:rPr lang="en" sz="1800" dirty="0" smtClean="0"/>
+              <a:rPr lang="en" sz="1600" dirty="0" smtClean="0">
+                <a:latin typeface="Times New Roman" panose="02020603050405020304" pitchFamily="18" charset="0"/>
+                <a:cs typeface="Times New Roman" panose="02020603050405020304" pitchFamily="18" charset="0"/>
+              </a:rPr>
               <a:t>Dominos</a:t>
             </a:r>
           </a:p>
@@ -11804,10 +11980,16 @@
               </a:spcBef>
             </a:pPr>
             <a:r>
-              <a:rPr lang="en" sz="1800" dirty="0"/>
+              <a:rPr lang="en" sz="1600" dirty="0">
+                <a:latin typeface="Times New Roman" panose="02020603050405020304" pitchFamily="18" charset="0"/>
+                <a:cs typeface="Times New Roman" panose="02020603050405020304" pitchFamily="18" charset="0"/>
+              </a:rPr>
               <a:t> Facebook</a:t>
             </a:r>
-            <a:endParaRPr sz="1800" dirty="0"/>
+            <a:endParaRPr sz="1600" dirty="0">
+              <a:latin typeface="Times New Roman" panose="02020603050405020304" pitchFamily="18" charset="0"/>
+              <a:cs typeface="Times New Roman" panose="02020603050405020304" pitchFamily="18" charset="0"/>
+            </a:endParaRPr>
           </a:p>
           <a:p>
             <a:pPr marL="0" lvl="0" indent="0">
@@ -11820,12 +12002,22 @@
               <a:buNone/>
             </a:pPr>
             <a:r>
-              <a:rPr lang="en" sz="1800" dirty="0" smtClean="0"/>
+              <a:rPr lang="en" sz="1600" dirty="0" smtClean="0">
+                <a:latin typeface="Times New Roman" panose="02020603050405020304" pitchFamily="18" charset="0"/>
+                <a:cs typeface="Times New Roman" panose="02020603050405020304" pitchFamily="18" charset="0"/>
+              </a:rPr>
               <a:t> </a:t>
             </a:r>
             <a:r>
+              <a:rPr lang="en" sz="1600" dirty="0">
+                <a:latin typeface="Times New Roman" panose="02020603050405020304" pitchFamily="18" charset="0"/>
+                <a:cs typeface="Times New Roman" panose="02020603050405020304" pitchFamily="18" charset="0"/>
+              </a:rPr>
+              <a:t>	</a:t>
+            </a:r>
+            <a:r>
               <a:rPr lang="en" sz="1800" dirty="0"/>
-              <a:t>					</a:t>
+              <a:t>				</a:t>
             </a:r>
             <a:r>
               <a:rPr lang="en" sz="1600" dirty="0">
@@ -11866,6 +12058,38 @@
               </a:spcAft>
             </a:pPr>
             <a:endParaRPr dirty="0"/>
+          </a:p>
+        </p:txBody>
+      </p:sp>
+      <p:sp>
+        <p:nvSpPr>
+          <p:cNvPr id="2" name="Slide Number Placeholder 1"/>
+          <p:cNvSpPr>
+            <a:spLocks noGrp="1"/>
+          </p:cNvSpPr>
+          <p:nvPr>
+            <p:ph type="sldNum" idx="12"/>
+          </p:nvPr>
+        </p:nvSpPr>
+        <p:spPr/>
+        <p:txBody>
+          <a:bodyPr/>
+          <a:lstStyle/>
+          <a:p>
+            <a:pPr marL="0" lvl="0" indent="0" algn="r" rtl="0">
+              <a:spcBef>
+                <a:spcPts val="0"/>
+              </a:spcBef>
+              <a:spcAft>
+                <a:spcPts val="0"/>
+              </a:spcAft>
+              <a:buNone/>
+            </a:pPr>
+            <a:fld id="{00000000-1234-1234-1234-123412341234}" type="slidenum">
+              <a:rPr lang="en" smtClean="0"/>
+              <a:t>13</a:t>
+            </a:fld>
+            <a:endParaRPr lang="en"/>
           </a:p>
         </p:txBody>
       </p:sp>
@@ -11973,13 +12197,13 @@
           <a:p>
             <a:pPr marL="285750" indent="-285750"/>
             <a:r>
-              <a:rPr lang="en" sz="1400" b="1" dirty="0">
+              <a:rPr lang="en" sz="1600" b="1" dirty="0">
                 <a:latin typeface="Times New Roman" panose="02020603050405020304" pitchFamily="18" charset="0"/>
                 <a:cs typeface="Times New Roman" panose="02020603050405020304" pitchFamily="18" charset="0"/>
               </a:rPr>
               <a:t>Loggly:</a:t>
             </a:r>
-            <a:endParaRPr sz="1400" b="1" dirty="0">
+            <a:endParaRPr sz="1600" b="1" dirty="0">
               <a:latin typeface="Times New Roman" panose="02020603050405020304" pitchFamily="18" charset="0"/>
               <a:cs typeface="Times New Roman" panose="02020603050405020304" pitchFamily="18" charset="0"/>
             </a:endParaRPr>
@@ -11994,6 +12218,81 @@
               </a:spcAft>
               <a:buNone/>
             </a:pPr>
+            <a:r>
+              <a:rPr lang="en" sz="1600" dirty="0" smtClean="0">
+                <a:latin typeface="Times New Roman"/>
+                <a:ea typeface="Times New Roman"/>
+                <a:cs typeface="Times New Roman"/>
+                <a:sym typeface="Times New Roman"/>
+              </a:rPr>
+              <a:t>               It </a:t>
+            </a:r>
+            <a:r>
+              <a:rPr lang="en" sz="1600" dirty="0">
+                <a:latin typeface="Times New Roman"/>
+                <a:ea typeface="Times New Roman"/>
+                <a:cs typeface="Times New Roman"/>
+                <a:sym typeface="Times New Roman"/>
+              </a:rPr>
+              <a:t>enables you to analyze logs and quickly search. The tool helps you collect system data with compatibility with Syslog.</a:t>
+            </a:r>
+            <a:endParaRPr sz="1600" dirty="0">
+              <a:latin typeface="Times New Roman"/>
+              <a:ea typeface="Times New Roman"/>
+              <a:cs typeface="Times New Roman"/>
+              <a:sym typeface="Times New Roman"/>
+            </a:endParaRPr>
+          </a:p>
+          <a:p>
+            <a:pPr marL="285750" indent="-285750">
+              <a:spcBef>
+                <a:spcPts val="1600"/>
+              </a:spcBef>
+            </a:pPr>
+            <a:r>
+              <a:rPr lang="en" sz="1600" b="1" dirty="0">
+                <a:latin typeface="Times New Roman"/>
+                <a:ea typeface="Times New Roman"/>
+                <a:cs typeface="Times New Roman"/>
+                <a:sym typeface="Times New Roman"/>
+              </a:rPr>
+              <a:t>LogFaces:</a:t>
+            </a:r>
+            <a:endParaRPr sz="1600" b="1" dirty="0">
+              <a:latin typeface="Times New Roman"/>
+              <a:ea typeface="Times New Roman"/>
+              <a:cs typeface="Times New Roman"/>
+              <a:sym typeface="Times New Roman"/>
+            </a:endParaRPr>
+          </a:p>
+          <a:p>
+            <a:pPr marL="0" lvl="0" indent="0" algn="l" rtl="0">
+              <a:spcBef>
+                <a:spcPts val="1400"/>
+              </a:spcBef>
+              <a:spcAft>
+                <a:spcPts val="400"/>
+              </a:spcAft>
+              <a:buNone/>
+            </a:pPr>
+            <a:r>
+              <a:rPr lang="en" sz="1600" dirty="0" smtClean="0">
+                <a:latin typeface="Times New Roman"/>
+                <a:ea typeface="Times New Roman"/>
+                <a:cs typeface="Times New Roman"/>
+                <a:sym typeface="Times New Roman"/>
+              </a:rPr>
+              <a:t>             Logfaces </a:t>
+            </a:r>
+            <a:r>
+              <a:rPr lang="en" sz="1600" dirty="0">
+                <a:latin typeface="Times New Roman"/>
+                <a:ea typeface="Times New Roman"/>
+                <a:cs typeface="Times New Roman"/>
+                <a:sym typeface="Times New Roman"/>
+              </a:rPr>
+              <a:t>are another spunk alternative to send your queries via e-mail. This tool maintains log information in the building. A simple desktop application is included in the tool</a:t>
+            </a:r>
             <a:r>
               <a:rPr lang="en" sz="1400" dirty="0">
                 <a:latin typeface="Times New Roman"/>
@@ -12001,55 +12300,7 @@
                 <a:cs typeface="Times New Roman"/>
                 <a:sym typeface="Times New Roman"/>
               </a:rPr>
-              <a:t>It enables you to analyze logs and quickly search. The tool helps you collect system data with compatibility with Syslog.</a:t>
-            </a:r>
-            <a:endParaRPr sz="1400" dirty="0">
-              <a:latin typeface="Times New Roman"/>
-              <a:ea typeface="Times New Roman"/>
-              <a:cs typeface="Times New Roman"/>
-              <a:sym typeface="Times New Roman"/>
-            </a:endParaRPr>
-          </a:p>
-          <a:p>
-            <a:pPr marL="285750" indent="-285750">
-              <a:spcBef>
-                <a:spcPts val="1600"/>
-              </a:spcBef>
-            </a:pPr>
-            <a:r>
-              <a:rPr lang="en" sz="1400" b="1" dirty="0">
-                <a:latin typeface="Times New Roman"/>
-                <a:ea typeface="Times New Roman"/>
-                <a:cs typeface="Times New Roman"/>
-                <a:sym typeface="Times New Roman"/>
-              </a:rPr>
-              <a:t>LogFaces:</a:t>
-            </a:r>
-            <a:endParaRPr sz="1400" b="1" dirty="0">
-              <a:latin typeface="Times New Roman"/>
-              <a:ea typeface="Times New Roman"/>
-              <a:cs typeface="Times New Roman"/>
-              <a:sym typeface="Times New Roman"/>
-            </a:endParaRPr>
-          </a:p>
-          <a:p>
-            <a:pPr marL="0" lvl="0" indent="0" algn="l" rtl="0">
-              <a:spcBef>
-                <a:spcPts val="1400"/>
-              </a:spcBef>
-              <a:spcAft>
-                <a:spcPts val="400"/>
-              </a:spcAft>
-              <a:buNone/>
-            </a:pPr>
-            <a:r>
-              <a:rPr lang="en" sz="1400" dirty="0">
-                <a:latin typeface="Times New Roman"/>
-                <a:ea typeface="Times New Roman"/>
-                <a:cs typeface="Times New Roman"/>
-                <a:sym typeface="Times New Roman"/>
-              </a:rPr>
-              <a:t>Logfaces are another spunk alternative to send your queries via e-mail. This tool maintains log information in the building. A simple desktop application is included in the tool.</a:t>
+              <a:t>.</a:t>
             </a:r>
           </a:p>
           <a:p>
@@ -12101,6 +12352,38 @@
               <a:cs typeface="Times New Roman"/>
               <a:sym typeface="Times New Roman"/>
             </a:endParaRPr>
+          </a:p>
+        </p:txBody>
+      </p:sp>
+      <p:sp>
+        <p:nvSpPr>
+          <p:cNvPr id="2" name="Slide Number Placeholder 1"/>
+          <p:cNvSpPr>
+            <a:spLocks noGrp="1"/>
+          </p:cNvSpPr>
+          <p:nvPr>
+            <p:ph type="sldNum" idx="12"/>
+          </p:nvPr>
+        </p:nvSpPr>
+        <p:spPr/>
+        <p:txBody>
+          <a:bodyPr/>
+          <a:lstStyle/>
+          <a:p>
+            <a:pPr marL="0" lvl="0" indent="0" algn="r" rtl="0">
+              <a:spcBef>
+                <a:spcPts val="0"/>
+              </a:spcBef>
+              <a:spcAft>
+                <a:spcPts val="0"/>
+              </a:spcAft>
+              <a:buNone/>
+            </a:pPr>
+            <a:fld id="{00000000-1234-1234-1234-123412341234}" type="slidenum">
+              <a:rPr lang="en" smtClean="0"/>
+              <a:t>14</a:t>
+            </a:fld>
+            <a:endParaRPr lang="en"/>
           </a:p>
         </p:txBody>
       </p:sp>
@@ -12220,7 +12503,46 @@
                 <a:cs typeface="Times New Roman"/>
                 <a:sym typeface="Times New Roman"/>
               </a:rPr>
-              <a:t>Difficulties &amp; Challenges : Unstructured data, manual searches and maintaining preferences.</a:t>
+              <a:t>Difficulties &amp; Challenges </a:t>
+            </a:r>
+            <a:r>
+              <a:rPr lang="en" sz="1600" dirty="0" smtClean="0">
+                <a:latin typeface="Times New Roman"/>
+                <a:ea typeface="Times New Roman"/>
+                <a:cs typeface="Times New Roman"/>
+                <a:sym typeface="Times New Roman"/>
+              </a:rPr>
+              <a:t>:</a:t>
+            </a:r>
+          </a:p>
+          <a:p>
+            <a:pPr marL="114300" lvl="0" indent="0" algn="l" rtl="0">
+              <a:spcBef>
+                <a:spcPts val="0"/>
+              </a:spcBef>
+              <a:spcAft>
+                <a:spcPts val="0"/>
+              </a:spcAft>
+              <a:buSzPts val="1800"/>
+              <a:buNone/>
+            </a:pPr>
+            <a:r>
+              <a:rPr lang="en" sz="1600" dirty="0" smtClean="0">
+                <a:latin typeface="Times New Roman"/>
+                <a:ea typeface="Times New Roman"/>
+                <a:cs typeface="Times New Roman"/>
+                <a:sym typeface="Times New Roman"/>
+              </a:rPr>
+              <a:t> </a:t>
+            </a:r>
+            <a:r>
+              <a:rPr lang="en" sz="1600" dirty="0">
+                <a:latin typeface="Times New Roman"/>
+                <a:ea typeface="Times New Roman"/>
+                <a:cs typeface="Times New Roman"/>
+                <a:sym typeface="Times New Roman"/>
+              </a:rPr>
+              <a:t>Unstructured data, manual searches and maintaining preferences.</a:t>
             </a:r>
             <a:endParaRPr sz="1600" dirty="0">
               <a:latin typeface="Times New Roman"/>
@@ -12248,7 +12570,43 @@
                 <a:cs typeface="Times New Roman"/>
                 <a:sym typeface="Times New Roman"/>
               </a:rPr>
-              <a:t>Splunk to Dominos : Search the data faster, monitor the performance,interactive apps, real-time feedback and  get better insights.</a:t>
+              <a:t>Splunk to Dominos : </a:t>
+            </a:r>
+            <a:endParaRPr lang="en" sz="1600" dirty="0" smtClean="0">
+              <a:latin typeface="Times New Roman"/>
+              <a:ea typeface="Times New Roman"/>
+              <a:cs typeface="Times New Roman"/>
+              <a:sym typeface="Times New Roman"/>
+            </a:endParaRPr>
+          </a:p>
+          <a:p>
+            <a:pPr marL="114300" lvl="0" indent="0" algn="l" rtl="0">
+              <a:spcBef>
+                <a:spcPts val="0"/>
+              </a:spcBef>
+              <a:spcAft>
+                <a:spcPts val="0"/>
+              </a:spcAft>
+              <a:buSzPts val="1800"/>
+              <a:buNone/>
+            </a:pPr>
+            <a:r>
+              <a:rPr lang="en" sz="1600" dirty="0" smtClean="0">
+                <a:latin typeface="Times New Roman"/>
+                <a:ea typeface="Times New Roman"/>
+                <a:cs typeface="Times New Roman"/>
+                <a:sym typeface="Times New Roman"/>
+              </a:rPr>
+              <a:t>Search </a:t>
+            </a:r>
+            <a:r>
+              <a:rPr lang="en" sz="1600" dirty="0">
+                <a:latin typeface="Times New Roman"/>
+                <a:ea typeface="Times New Roman"/>
+                <a:cs typeface="Times New Roman"/>
+                <a:sym typeface="Times New Roman"/>
+              </a:rPr>
+              <a:t>the data faster, monitor the performance,interactive apps, real-time feedback and  get better insights.</a:t>
             </a:r>
             <a:endParaRPr sz="1600" dirty="0">
               <a:latin typeface="Times New Roman"/>
@@ -12322,6 +12680,38 @@
                 <a:schemeClr val="bg1"/>
               </a:solidFill>
             </a:endParaRPr>
+          </a:p>
+        </p:txBody>
+      </p:sp>
+      <p:sp>
+        <p:nvSpPr>
+          <p:cNvPr id="2" name="Slide Number Placeholder 1"/>
+          <p:cNvSpPr>
+            <a:spLocks noGrp="1"/>
+          </p:cNvSpPr>
+          <p:nvPr>
+            <p:ph type="sldNum" idx="12"/>
+          </p:nvPr>
+        </p:nvSpPr>
+        <p:spPr/>
+        <p:txBody>
+          <a:bodyPr/>
+          <a:lstStyle/>
+          <a:p>
+            <a:pPr marL="0" lvl="0" indent="0" algn="r" rtl="0">
+              <a:spcBef>
+                <a:spcPts val="0"/>
+              </a:spcBef>
+              <a:spcAft>
+                <a:spcPts val="0"/>
+              </a:spcAft>
+              <a:buNone/>
+            </a:pPr>
+            <a:fld id="{00000000-1234-1234-1234-123412341234}" type="slidenum">
+              <a:rPr lang="en" smtClean="0"/>
+              <a:t>15</a:t>
+            </a:fld>
+            <a:endParaRPr lang="en"/>
           </a:p>
         </p:txBody>
       </p:sp>
@@ -12494,6 +12884,38 @@
           </a:p>
         </p:txBody>
       </p:sp>
+      <p:sp>
+        <p:nvSpPr>
+          <p:cNvPr id="2" name="Slide Number Placeholder 1"/>
+          <p:cNvSpPr>
+            <a:spLocks noGrp="1"/>
+          </p:cNvSpPr>
+          <p:nvPr>
+            <p:ph type="sldNum" idx="12"/>
+          </p:nvPr>
+        </p:nvSpPr>
+        <p:spPr/>
+        <p:txBody>
+          <a:bodyPr/>
+          <a:lstStyle/>
+          <a:p>
+            <a:pPr marL="0" lvl="0" indent="0" algn="r" rtl="0">
+              <a:spcBef>
+                <a:spcPts val="0"/>
+              </a:spcBef>
+              <a:spcAft>
+                <a:spcPts val="0"/>
+              </a:spcAft>
+              <a:buNone/>
+            </a:pPr>
+            <a:fld id="{00000000-1234-1234-1234-123412341234}" type="slidenum">
+              <a:rPr lang="en" smtClean="0"/>
+              <a:t>16</a:t>
+            </a:fld>
+            <a:endParaRPr lang="en"/>
+          </a:p>
+        </p:txBody>
+      </p:sp>
     </p:spTree>
   </p:cSld>
   <p:clrMapOvr>
@@ -12634,6 +13056,38 @@
               <a:t>https://www.google.com/search?q=what+is+a+splunk&amp;rlz=1C1GCEB_enUS811US811&amp;oq=what+is+a+splunk&amp;aqs=chrome..69i57j0l5.3715j1j7&amp;sourceid=chrome&amp;ie=UTF-8</a:t>
             </a:r>
             <a:endParaRPr/>
+          </a:p>
+        </p:txBody>
+      </p:sp>
+      <p:sp>
+        <p:nvSpPr>
+          <p:cNvPr id="2" name="Slide Number Placeholder 1"/>
+          <p:cNvSpPr>
+            <a:spLocks noGrp="1"/>
+          </p:cNvSpPr>
+          <p:nvPr>
+            <p:ph type="sldNum" idx="12"/>
+          </p:nvPr>
+        </p:nvSpPr>
+        <p:spPr/>
+        <p:txBody>
+          <a:bodyPr/>
+          <a:lstStyle/>
+          <a:p>
+            <a:pPr marL="0" lvl="0" indent="0" algn="r" rtl="0">
+              <a:spcBef>
+                <a:spcPts val="0"/>
+              </a:spcBef>
+              <a:spcAft>
+                <a:spcPts val="0"/>
+              </a:spcAft>
+              <a:buNone/>
+            </a:pPr>
+            <a:fld id="{00000000-1234-1234-1234-123412341234}" type="slidenum">
+              <a:rPr lang="en" smtClean="0"/>
+              <a:t>17</a:t>
+            </a:fld>
+            <a:endParaRPr lang="en"/>
           </a:p>
         </p:txBody>
       </p:sp>
@@ -12870,6 +13324,38 @@
           </a:ln>
         </p:spPr>
       </p:pic>
+      <p:sp>
+        <p:nvSpPr>
+          <p:cNvPr id="2" name="Slide Number Placeholder 1"/>
+          <p:cNvSpPr>
+            <a:spLocks noGrp="1"/>
+          </p:cNvSpPr>
+          <p:nvPr>
+            <p:ph type="sldNum" idx="12"/>
+          </p:nvPr>
+        </p:nvSpPr>
+        <p:spPr/>
+        <p:txBody>
+          <a:bodyPr/>
+          <a:lstStyle/>
+          <a:p>
+            <a:pPr marL="0" lvl="0" indent="0" algn="r" rtl="0">
+              <a:spcBef>
+                <a:spcPts val="0"/>
+              </a:spcBef>
+              <a:spcAft>
+                <a:spcPts val="0"/>
+              </a:spcAft>
+              <a:buNone/>
+            </a:pPr>
+            <a:fld id="{00000000-1234-1234-1234-123412341234}" type="slidenum">
+              <a:rPr lang="en" smtClean="0"/>
+              <a:t>18</a:t>
+            </a:fld>
+            <a:endParaRPr lang="en"/>
+          </a:p>
+        </p:txBody>
+      </p:sp>
     </p:spTree>
     <p:extLst>
       <p:ext uri="{BB962C8B-B14F-4D97-AF65-F5344CB8AC3E}">
@@ -13108,6 +13594,38 @@
           </a:ln>
         </p:spPr>
       </p:pic>
+      <p:sp>
+        <p:nvSpPr>
+          <p:cNvPr id="2" name="Slide Number Placeholder 1"/>
+          <p:cNvSpPr>
+            <a:spLocks noGrp="1"/>
+          </p:cNvSpPr>
+          <p:nvPr>
+            <p:ph type="sldNum" idx="12"/>
+          </p:nvPr>
+        </p:nvSpPr>
+        <p:spPr/>
+        <p:txBody>
+          <a:bodyPr/>
+          <a:lstStyle/>
+          <a:p>
+            <a:pPr marL="0" lvl="0" indent="0" algn="r" rtl="0">
+              <a:spcBef>
+                <a:spcPts val="0"/>
+              </a:spcBef>
+              <a:spcAft>
+                <a:spcPts val="0"/>
+              </a:spcAft>
+              <a:buNone/>
+            </a:pPr>
+            <a:fld id="{00000000-1234-1234-1234-123412341234}" type="slidenum">
+              <a:rPr lang="en" smtClean="0"/>
+              <a:t>2</a:t>
+            </a:fld>
+            <a:endParaRPr lang="en"/>
+          </a:p>
+        </p:txBody>
+      </p:sp>
     </p:spTree>
   </p:cSld>
   <p:clrMapOvr>
@@ -13208,13 +13726,13 @@
           <a:p>
             <a:pPr marL="171450" indent="-171450"/>
             <a:r>
-              <a:rPr lang="en" sz="1400" dirty="0">
+              <a:rPr lang="en" sz="1600" dirty="0">
                 <a:latin typeface="Times New Roman" panose="02020603050405020304" pitchFamily="18" charset="0"/>
                 <a:cs typeface="Times New Roman" panose="02020603050405020304" pitchFamily="18" charset="0"/>
               </a:rPr>
               <a:t>Splunk is an advanced, scalable and efficient technology for indexing and searching log files stored on your system.</a:t>
             </a:r>
-            <a:endParaRPr sz="1400" dirty="0">
+            <a:endParaRPr sz="1600" dirty="0">
               <a:latin typeface="Times New Roman" panose="02020603050405020304" pitchFamily="18" charset="0"/>
               <a:cs typeface="Times New Roman" panose="02020603050405020304" pitchFamily="18" charset="0"/>
             </a:endParaRPr>
@@ -13226,13 +13744,13 @@
               </a:spcBef>
             </a:pPr>
             <a:r>
-              <a:rPr lang="en" sz="1400" dirty="0">
+              <a:rPr lang="en" sz="1600" dirty="0">
                 <a:latin typeface="Times New Roman" panose="02020603050405020304" pitchFamily="18" charset="0"/>
                 <a:cs typeface="Times New Roman" panose="02020603050405020304" pitchFamily="18" charset="0"/>
               </a:rPr>
               <a:t>Log aggregation function - Quickly search storage scattered log files across the host</a:t>
             </a:r>
-            <a:endParaRPr sz="1400" dirty="0">
+            <a:endParaRPr sz="1600" dirty="0">
               <a:latin typeface="Times New Roman" panose="02020603050405020304" pitchFamily="18" charset="0"/>
               <a:cs typeface="Times New Roman" panose="02020603050405020304" pitchFamily="18" charset="0"/>
             </a:endParaRPr>
@@ -13244,13 +13762,13 @@
               </a:spcBef>
             </a:pPr>
             <a:r>
-              <a:rPr lang="en" sz="1400" dirty="0">
+              <a:rPr lang="en" sz="1600" dirty="0">
                 <a:latin typeface="Times New Roman" panose="02020603050405020304" pitchFamily="18" charset="0"/>
                 <a:cs typeface="Times New Roman" panose="02020603050405020304" pitchFamily="18" charset="0"/>
               </a:rPr>
               <a:t>Search and extraction — you can search easily and then group and aggregate</a:t>
             </a:r>
-            <a:endParaRPr sz="1400" dirty="0">
+            <a:endParaRPr sz="1600" dirty="0">
               <a:latin typeface="Times New Roman" panose="02020603050405020304" pitchFamily="18" charset="0"/>
               <a:cs typeface="Times New Roman" panose="02020603050405020304" pitchFamily="18" charset="0"/>
             </a:endParaRPr>
@@ -13262,13 +13780,13 @@
               </a:spcBef>
             </a:pPr>
             <a:r>
-              <a:rPr lang="en" sz="1400" dirty="0">
+              <a:rPr lang="en" sz="1600" dirty="0">
                 <a:latin typeface="Times New Roman" panose="02020603050405020304" pitchFamily="18" charset="0"/>
                 <a:cs typeface="Times New Roman" panose="02020603050405020304" pitchFamily="18" charset="0"/>
               </a:rPr>
               <a:t>Visualization - Create charts with different operations, such as pie charts, histograms, row and column charts, and other complex charts</a:t>
             </a:r>
-            <a:endParaRPr sz="1400" dirty="0">
+            <a:endParaRPr sz="1600" dirty="0">
               <a:latin typeface="Times New Roman" panose="02020603050405020304" pitchFamily="18" charset="0"/>
               <a:cs typeface="Times New Roman" panose="02020603050405020304" pitchFamily="18" charset="0"/>
             </a:endParaRPr>
@@ -13283,7 +13801,7 @@
               </a:spcAft>
             </a:pPr>
             <a:r>
-              <a:rPr lang="en" sz="1400" dirty="0">
+              <a:rPr lang="en" sz="1600" dirty="0">
                 <a:latin typeface="Times New Roman" panose="02020603050405020304" pitchFamily="18" charset="0"/>
                 <a:cs typeface="Times New Roman" panose="02020603050405020304" pitchFamily="18" charset="0"/>
               </a:rPr>
@@ -13311,6 +13829,38 @@
               <a:latin typeface="Times New Roman" panose="02020603050405020304" pitchFamily="18" charset="0"/>
               <a:cs typeface="Times New Roman" panose="02020603050405020304" pitchFamily="18" charset="0"/>
             </a:endParaRPr>
+          </a:p>
+        </p:txBody>
+      </p:sp>
+      <p:sp>
+        <p:nvSpPr>
+          <p:cNvPr id="2" name="Slide Number Placeholder 1"/>
+          <p:cNvSpPr>
+            <a:spLocks noGrp="1"/>
+          </p:cNvSpPr>
+          <p:nvPr>
+            <p:ph type="sldNum" idx="12"/>
+          </p:nvPr>
+        </p:nvSpPr>
+        <p:spPr/>
+        <p:txBody>
+          <a:bodyPr/>
+          <a:lstStyle/>
+          <a:p>
+            <a:pPr marL="0" lvl="0" indent="0" algn="r" rtl="0">
+              <a:spcBef>
+                <a:spcPts val="0"/>
+              </a:spcBef>
+              <a:spcAft>
+                <a:spcPts val="0"/>
+              </a:spcAft>
+              <a:buNone/>
+            </a:pPr>
+            <a:fld id="{00000000-1234-1234-1234-123412341234}" type="slidenum">
+              <a:rPr lang="en" smtClean="0"/>
+              <a:t>3</a:t>
+            </a:fld>
+            <a:endParaRPr lang="en"/>
           </a:p>
         </p:txBody>
       </p:sp>
@@ -13414,7 +13964,7 @@
           <a:p>
             <a:pPr marL="171450" indent="-171450"/>
             <a:r>
-              <a:rPr lang="en-US" sz="1400" dirty="0">
+              <a:rPr lang="en-US" sz="1600" dirty="0">
                 <a:latin typeface="Times New Roman" panose="02020603050405020304" pitchFamily="18" charset="0"/>
                 <a:cs typeface="Times New Roman" panose="02020603050405020304" pitchFamily="18" charset="0"/>
               </a:rPr>
@@ -13428,7 +13978,7 @@
               </a:spcBef>
             </a:pPr>
             <a:r>
-              <a:rPr lang="en-US" sz="1400" dirty="0">
+              <a:rPr lang="en-US" sz="1600" dirty="0">
                 <a:latin typeface="Times New Roman" panose="02020603050405020304" pitchFamily="18" charset="0"/>
                 <a:cs typeface="Times New Roman" panose="02020603050405020304" pitchFamily="18" charset="0"/>
               </a:rPr>
@@ -13442,11 +13992,50 @@
               </a:spcBef>
             </a:pPr>
             <a:r>
-              <a:rPr lang="en-US" sz="1400" dirty="0">
+              <a:rPr lang="en-US" sz="1600" dirty="0">
                 <a:latin typeface="Times New Roman" panose="02020603050405020304" pitchFamily="18" charset="0"/>
                 <a:cs typeface="Times New Roman" panose="02020603050405020304" pitchFamily="18" charset="0"/>
               </a:rPr>
               <a:t>Multi-platform support - Currently Splunk supports Windows XP, Vista, 7, and 8 (32-bit/64-bit)/Windows Server 2003, 2003 R2, 2008, and 2008 R2 (32-bit/64-bit) 2.6+ kernel Linux distributions (32-bit/64-bit), Solaris (8, 9, 10, 11), OSX (10.5, 10.6, 10.7), FreeBSD 7, 8 (32-bit/64-bit), AIX (5.3, 6.1, 7.1), HP-UX (11i v2, 11i v3).</a:t>
+            </a:r>
+          </a:p>
+          <a:p>
+            <a:pPr marL="0" indent="0">
+              <a:spcBef>
+                <a:spcPts val="1600"/>
+              </a:spcBef>
+              <a:spcAft>
+                <a:spcPts val="1600"/>
+              </a:spcAft>
+              <a:buNone/>
+            </a:pPr>
+            <a:r>
+              <a:rPr lang="en-US" sz="1200" dirty="0" smtClean="0">
+                <a:latin typeface="Times New Roman" panose="02020603050405020304" pitchFamily="18" charset="0"/>
+                <a:cs typeface="Times New Roman" panose="02020603050405020304" pitchFamily="18" charset="0"/>
+              </a:rPr>
+              <a:t>                                                                                                                                                     </a:t>
+            </a:r>
+            <a:r>
+              <a:rPr lang="en-US" sz="1200" dirty="0" err="1" smtClean="0">
+                <a:latin typeface="Times New Roman" panose="02020603050405020304" pitchFamily="18" charset="0"/>
+                <a:cs typeface="Times New Roman" panose="02020603050405020304" pitchFamily="18" charset="0"/>
+              </a:rPr>
+              <a:t>Hongyang</a:t>
+            </a:r>
+            <a:r>
+              <a:rPr lang="en-US" sz="1200" dirty="0" smtClean="0">
+                <a:latin typeface="Times New Roman" panose="02020603050405020304" pitchFamily="18" charset="0"/>
+                <a:cs typeface="Times New Roman" panose="02020603050405020304" pitchFamily="18" charset="0"/>
+              </a:rPr>
+              <a:t> </a:t>
+            </a:r>
+            <a:r>
+              <a:rPr lang="en-US" sz="1200" dirty="0">
+                <a:latin typeface="Times New Roman" panose="02020603050405020304" pitchFamily="18" charset="0"/>
+                <a:cs typeface="Times New Roman" panose="02020603050405020304" pitchFamily="18" charset="0"/>
+              </a:rPr>
+              <a:t>Wang </a:t>
             </a:r>
           </a:p>
           <a:p>
@@ -13483,6 +14072,38 @@
               <a:t> Hongyang Wang </a:t>
             </a:r>
             <a:endParaRPr dirty="0"/>
+          </a:p>
+        </p:txBody>
+      </p:sp>
+      <p:sp>
+        <p:nvSpPr>
+          <p:cNvPr id="2" name="Slide Number Placeholder 1"/>
+          <p:cNvSpPr>
+            <a:spLocks noGrp="1"/>
+          </p:cNvSpPr>
+          <p:nvPr>
+            <p:ph type="sldNum" idx="12"/>
+          </p:nvPr>
+        </p:nvSpPr>
+        <p:spPr/>
+        <p:txBody>
+          <a:bodyPr/>
+          <a:lstStyle/>
+          <a:p>
+            <a:pPr marL="0" lvl="0" indent="0" algn="r" rtl="0">
+              <a:spcBef>
+                <a:spcPts val="0"/>
+              </a:spcBef>
+              <a:spcAft>
+                <a:spcPts val="0"/>
+              </a:spcAft>
+              <a:buNone/>
+            </a:pPr>
+            <a:fld id="{00000000-1234-1234-1234-123412341234}" type="slidenum">
+              <a:rPr lang="en" smtClean="0"/>
+              <a:t>4</a:t>
+            </a:fld>
+            <a:endParaRPr lang="en"/>
           </a:p>
         </p:txBody>
       </p:sp>
@@ -13586,13 +14207,13 @@
           <a:p>
             <a:pPr marL="285750" indent="-285750"/>
             <a:r>
-              <a:rPr lang="en" sz="1400" dirty="0">
+              <a:rPr lang="en" sz="1600" dirty="0">
                 <a:latin typeface="Times New Roman" panose="02020603050405020304" pitchFamily="18" charset="0"/>
                 <a:cs typeface="Times New Roman" panose="02020603050405020304" pitchFamily="18" charset="0"/>
               </a:rPr>
               <a:t>Index arbitrary data from any source - Splunk can index any type of computer data from any source in real time</a:t>
             </a:r>
-            <a:endParaRPr sz="1400" dirty="0">
+            <a:endParaRPr sz="1600" dirty="0">
               <a:latin typeface="Times New Roman" panose="02020603050405020304" pitchFamily="18" charset="0"/>
               <a:cs typeface="Times New Roman" panose="02020603050405020304" pitchFamily="18" charset="0"/>
             </a:endParaRPr>
@@ -13604,13 +14225,13 @@
               </a:spcBef>
             </a:pPr>
             <a:r>
-              <a:rPr lang="en" sz="1400" dirty="0">
+              <a:rPr lang="en" sz="1600" dirty="0">
                 <a:latin typeface="Times New Roman" panose="02020603050405020304" pitchFamily="18" charset="0"/>
                 <a:cs typeface="Times New Roman" panose="02020603050405020304" pitchFamily="18" charset="0"/>
               </a:rPr>
               <a:t>Splunk Forwarder - Splunk Forwarder can be deployed if the required data is not available over the network, or if the required data is not visible on the server where Splunk is installed.</a:t>
             </a:r>
-            <a:endParaRPr sz="1400" dirty="0">
+            <a:endParaRPr sz="1600" dirty="0">
               <a:latin typeface="Times New Roman" panose="02020603050405020304" pitchFamily="18" charset="0"/>
               <a:cs typeface="Times New Roman" panose="02020603050405020304" pitchFamily="18" charset="0"/>
             </a:endParaRPr>
@@ -13622,13 +14243,13 @@
               </a:spcBef>
             </a:pPr>
             <a:r>
-              <a:rPr lang="en" sz="1400" dirty="0">
+              <a:rPr lang="en" sz="1600" dirty="0">
                 <a:latin typeface="Times New Roman" panose="02020603050405020304" pitchFamily="18" charset="0"/>
                 <a:cs typeface="Times New Roman" panose="02020603050405020304" pitchFamily="18" charset="0"/>
               </a:rPr>
               <a:t>Security - Splunk is a powerful security model.</a:t>
             </a:r>
-            <a:endParaRPr sz="1400" dirty="0">
+            <a:endParaRPr sz="1600" dirty="0">
               <a:latin typeface="Times New Roman" panose="02020603050405020304" pitchFamily="18" charset="0"/>
               <a:cs typeface="Times New Roman" panose="02020603050405020304" pitchFamily="18" charset="0"/>
             </a:endParaRPr>
@@ -13646,18 +14267,6 @@
             <a:endParaRPr lang="en-US" dirty="0"/>
           </a:p>
           <a:p>
-            <a:pPr marL="0" lvl="0" indent="0" algn="l" rtl="0">
-              <a:spcBef>
-                <a:spcPts val="1200"/>
-              </a:spcBef>
-              <a:spcAft>
-                <a:spcPts val="1600"/>
-              </a:spcAft>
-              <a:buNone/>
-            </a:pPr>
-            <a:endParaRPr lang="en-US" dirty="0"/>
-          </a:p>
-          <a:p>
             <a:pPr marL="0" lvl="0" indent="0">
               <a:spcBef>
                 <a:spcPts val="1200"/>
@@ -13669,14 +14278,25 @@
             </a:pPr>
             <a:r>
               <a:rPr lang="en-US" dirty="0"/>
-              <a:t>						</a:t>
+              <a:t> </a:t>
+            </a:r>
+            <a:r>
+              <a:rPr lang="en-US" dirty="0" smtClean="0"/>
+              <a:t>                                                                                                                                                                                         </a:t>
+            </a:r>
+            <a:r>
+              <a:rPr lang="en" sz="1400" dirty="0" smtClean="0">
+                <a:latin typeface="Times New Roman" panose="02020603050405020304" pitchFamily="18" charset="0"/>
+                <a:cs typeface="Times New Roman" panose="02020603050405020304" pitchFamily="18" charset="0"/>
+              </a:rPr>
+              <a:t>Hongyang </a:t>
             </a:r>
             <a:r>
               <a:rPr lang="en" sz="1400" dirty="0">
                 <a:latin typeface="Times New Roman" panose="02020603050405020304" pitchFamily="18" charset="0"/>
                 <a:cs typeface="Times New Roman" panose="02020603050405020304" pitchFamily="18" charset="0"/>
               </a:rPr>
-              <a:t> Hongyang Wang </a:t>
+              <a:t>Wang </a:t>
             </a:r>
             <a:endParaRPr lang="en-US" dirty="0"/>
           </a:p>
@@ -13691,6 +14311,38 @@
               <a:buNone/>
             </a:pPr>
             <a:endParaRPr dirty="0"/>
+          </a:p>
+        </p:txBody>
+      </p:sp>
+      <p:sp>
+        <p:nvSpPr>
+          <p:cNvPr id="2" name="Slide Number Placeholder 1"/>
+          <p:cNvSpPr>
+            <a:spLocks noGrp="1"/>
+          </p:cNvSpPr>
+          <p:nvPr>
+            <p:ph type="sldNum" idx="12"/>
+          </p:nvPr>
+        </p:nvSpPr>
+        <p:spPr/>
+        <p:txBody>
+          <a:bodyPr/>
+          <a:lstStyle/>
+          <a:p>
+            <a:pPr marL="0" lvl="0" indent="0" algn="r" rtl="0">
+              <a:spcBef>
+                <a:spcPts val="0"/>
+              </a:spcBef>
+              <a:spcAft>
+                <a:spcPts val="0"/>
+              </a:spcAft>
+              <a:buNone/>
+            </a:pPr>
+            <a:fld id="{00000000-1234-1234-1234-123412341234}" type="slidenum">
+              <a:rPr lang="en" smtClean="0"/>
+              <a:t>5</a:t>
+            </a:fld>
+            <a:endParaRPr lang="en"/>
           </a:p>
         </p:txBody>
       </p:sp>
@@ -13893,6 +14545,38 @@
           </a:p>
         </p:txBody>
       </p:sp>
+      <p:sp>
+        <p:nvSpPr>
+          <p:cNvPr id="3" name="Slide Number Placeholder 2"/>
+          <p:cNvSpPr>
+            <a:spLocks noGrp="1"/>
+          </p:cNvSpPr>
+          <p:nvPr>
+            <p:ph type="sldNum" idx="12"/>
+          </p:nvPr>
+        </p:nvSpPr>
+        <p:spPr/>
+        <p:txBody>
+          <a:bodyPr/>
+          <a:lstStyle/>
+          <a:p>
+            <a:pPr marL="0" lvl="0" indent="0" algn="r" rtl="0">
+              <a:spcBef>
+                <a:spcPts val="0"/>
+              </a:spcBef>
+              <a:spcAft>
+                <a:spcPts val="0"/>
+              </a:spcAft>
+              <a:buNone/>
+            </a:pPr>
+            <a:fld id="{00000000-1234-1234-1234-123412341234}" type="slidenum">
+              <a:rPr lang="en" smtClean="0"/>
+              <a:t>6</a:t>
+            </a:fld>
+            <a:endParaRPr lang="en"/>
+          </a:p>
+        </p:txBody>
+      </p:sp>
     </p:spTree>
   </p:cSld>
   <p:clrMapOvr>
@@ -14001,7 +14685,7 @@
               <a:buNone/>
             </a:pPr>
             <a:r>
-              <a:rPr lang="en" sz="1400" dirty="0">
+              <a:rPr lang="en" sz="1600" dirty="0">
                 <a:latin typeface="Times New Roman"/>
                 <a:ea typeface="Times New Roman"/>
                 <a:cs typeface="Times New Roman"/>
@@ -14009,7 +14693,7 @@
               </a:rPr>
               <a:t>Forwarder:</a:t>
             </a:r>
-            <a:endParaRPr sz="1400" dirty="0">
+            <a:endParaRPr sz="1600" dirty="0">
               <a:latin typeface="Times New Roman"/>
               <a:ea typeface="Times New Roman"/>
               <a:cs typeface="Times New Roman"/>
@@ -14027,7 +14711,7 @@
               <a:buNone/>
             </a:pPr>
             <a:r>
-              <a:rPr lang="en" sz="1400" dirty="0">
+              <a:rPr lang="en" sz="1600" dirty="0">
                 <a:latin typeface="Times New Roman"/>
                 <a:ea typeface="Times New Roman"/>
                 <a:cs typeface="Times New Roman"/>
@@ -14035,7 +14719,7 @@
               </a:rPr>
               <a:t>Forwarder gather data from remote devices and passes data in real time to the database.</a:t>
             </a:r>
-            <a:endParaRPr sz="1400" dirty="0">
+            <a:endParaRPr sz="1600" dirty="0">
               <a:latin typeface="Times New Roman"/>
               <a:ea typeface="Times New Roman"/>
               <a:cs typeface="Times New Roman"/>
@@ -14053,7 +14737,7 @@
               <a:buNone/>
             </a:pPr>
             <a:r>
-              <a:rPr lang="en" sz="1400" dirty="0">
+              <a:rPr lang="en" sz="1600" dirty="0">
                 <a:latin typeface="Times New Roman"/>
                 <a:ea typeface="Times New Roman"/>
                 <a:cs typeface="Times New Roman"/>
@@ -14061,7 +14745,7 @@
               </a:rPr>
               <a:t>Indexer:</a:t>
             </a:r>
-            <a:endParaRPr sz="1400" dirty="0">
+            <a:endParaRPr sz="1600" dirty="0">
               <a:latin typeface="Times New Roman"/>
               <a:ea typeface="Times New Roman"/>
               <a:cs typeface="Times New Roman"/>
@@ -14079,7 +14763,7 @@
               <a:buNone/>
             </a:pPr>
             <a:r>
-              <a:rPr lang="en" sz="1400" dirty="0">
+              <a:rPr lang="en" sz="1600" dirty="0">
                 <a:latin typeface="Times New Roman"/>
                 <a:ea typeface="Times New Roman"/>
                 <a:cs typeface="Times New Roman"/>
@@ -14093,7 +14777,7 @@
               <a:buNone/>
             </a:pPr>
             <a:r>
-              <a:rPr lang="en-US" sz="1400" dirty="0">
+              <a:rPr lang="en-US" sz="1600" dirty="0">
                 <a:latin typeface="Times New Roman"/>
                 <a:ea typeface="Times New Roman"/>
                 <a:cs typeface="Times New Roman"/>
@@ -14113,37 +14797,25 @@
               <a:buNone/>
             </a:pPr>
             <a:r>
-              <a:rPr lang="en-US" sz="1400" dirty="0">
+              <a:rPr lang="en-US" sz="1600" dirty="0">
                 <a:latin typeface="Times New Roman"/>
                 <a:ea typeface="Times New Roman"/>
                 <a:cs typeface="Times New Roman"/>
                 <a:sym typeface="Times New Roman"/>
               </a:rPr>
-              <a:t>End users interact with Splunk through Search Head. It allows users to do search, analysis &amp; Visualization.</a:t>
+              <a:t>End users interact with Splunk through Search Head. It allows users to do search, analysis &amp; Visualization</a:t>
             </a:r>
-          </a:p>
-          <a:p>
-            <a:pPr marL="146050" indent="0">
-              <a:buNone/>
-            </a:pPr>
             <a:r>
-              <a:rPr lang="en-US" sz="1400" dirty="0">
+              <a:rPr lang="en-US" sz="1600" dirty="0" smtClean="0">
                 <a:latin typeface="Times New Roman"/>
                 <a:ea typeface="Times New Roman"/>
                 <a:cs typeface="Times New Roman"/>
                 <a:sym typeface="Times New Roman"/>
               </a:rPr>
-              <a:t>						</a:t>
+              <a:t>.                                                                     </a:t>
             </a:r>
             <a:r>
-              <a:rPr lang="en" sz="1400" dirty="0">
-                <a:latin typeface="Times New Roman" panose="02020603050405020304" pitchFamily="18" charset="0"/>
-                <a:cs typeface="Times New Roman" panose="02020603050405020304" pitchFamily="18" charset="0"/>
-              </a:rPr>
-              <a:t> </a:t>
-            </a:r>
-            <a:r>
-              <a:rPr lang="en" sz="1400" dirty="0">
+              <a:rPr lang="en" sz="1600" dirty="0" smtClean="0">
                 <a:solidFill>
                   <a:schemeClr val="bg1"/>
                 </a:solidFill>
@@ -14153,7 +14825,7 @@
               <a:t>Yas</a:t>
             </a:r>
             <a:r>
-              <a:rPr lang="en-US" sz="1400" dirty="0" err="1">
+              <a:rPr lang="en-US" sz="1600" dirty="0" err="1">
                 <a:solidFill>
                   <a:schemeClr val="bg1"/>
                 </a:solidFill>
@@ -14163,20 +14835,86 @@
               <a:t>wanth</a:t>
             </a:r>
             <a:r>
-              <a:rPr lang="en-US" sz="1400" dirty="0">
+              <a:rPr lang="en-US" sz="1600" dirty="0">
                 <a:solidFill>
                   <a:schemeClr val="bg1"/>
                 </a:solidFill>
                 <a:latin typeface="Times New Roman" panose="02020603050405020304" pitchFamily="18" charset="0"/>
                 <a:cs typeface="Times New Roman" panose="02020603050405020304" pitchFamily="18" charset="0"/>
               </a:rPr>
-              <a:t> Yarram</a:t>
+              <a:t> </a:t>
+            </a:r>
+            <a:r>
+              <a:rPr lang="en-US" sz="1600" dirty="0" err="1">
+                <a:solidFill>
+                  <a:schemeClr val="bg1"/>
+                </a:solidFill>
+                <a:latin typeface="Times New Roman" panose="02020603050405020304" pitchFamily="18" charset="0"/>
+                <a:cs typeface="Times New Roman" panose="02020603050405020304" pitchFamily="18" charset="0"/>
+              </a:rPr>
+              <a:t>Yarram</a:t>
+            </a:r>
+            <a:endParaRPr lang="en-US" sz="1600" dirty="0" smtClean="0">
+              <a:latin typeface="Times New Roman"/>
+              <a:ea typeface="Times New Roman"/>
+              <a:cs typeface="Times New Roman"/>
+              <a:sym typeface="Times New Roman"/>
+            </a:endParaRPr>
+          </a:p>
+          <a:p>
+            <a:pPr marL="0" lvl="0" indent="0">
+              <a:spcBef>
+                <a:spcPts val="1600"/>
+              </a:spcBef>
+              <a:spcAft>
+                <a:spcPts val="1600"/>
+              </a:spcAft>
+              <a:buNone/>
+            </a:pPr>
+            <a:r>
+              <a:rPr lang="en" sz="1400" dirty="0" smtClean="0">
+                <a:latin typeface="Times New Roman" panose="02020603050405020304" pitchFamily="18" charset="0"/>
+                <a:cs typeface="Times New Roman" panose="02020603050405020304" pitchFamily="18" charset="0"/>
+              </a:rPr>
+              <a:t> </a:t>
             </a:r>
             <a:endParaRPr lang="en-US" sz="1400" dirty="0">
               <a:solidFill>
                 <a:schemeClr val="bg1"/>
               </a:solidFill>
             </a:endParaRPr>
+          </a:p>
+        </p:txBody>
+      </p:sp>
+      <p:sp>
+        <p:nvSpPr>
+          <p:cNvPr id="2" name="Slide Number Placeholder 1"/>
+          <p:cNvSpPr>
+            <a:spLocks noGrp="1"/>
+          </p:cNvSpPr>
+          <p:nvPr>
+            <p:ph type="sldNum" idx="12"/>
+          </p:nvPr>
+        </p:nvSpPr>
+        <p:spPr/>
+        <p:txBody>
+          <a:bodyPr/>
+          <a:lstStyle/>
+          <a:p>
+            <a:pPr marL="0" lvl="0" indent="0" algn="r" rtl="0">
+              <a:spcBef>
+                <a:spcPts val="0"/>
+              </a:spcBef>
+              <a:spcAft>
+                <a:spcPts val="0"/>
+              </a:spcAft>
+              <a:buNone/>
+            </a:pPr>
+            <a:fld id="{00000000-1234-1234-1234-123412341234}" type="slidenum">
+              <a:rPr lang="en" smtClean="0"/>
+              <a:t>7</a:t>
+            </a:fld>
+            <a:endParaRPr lang="en"/>
           </a:p>
         </p:txBody>
       </p:sp>
@@ -14339,6 +15077,38 @@
           </a:p>
         </p:txBody>
       </p:sp>
+      <p:sp>
+        <p:nvSpPr>
+          <p:cNvPr id="3" name="Slide Number Placeholder 2"/>
+          <p:cNvSpPr>
+            <a:spLocks noGrp="1"/>
+          </p:cNvSpPr>
+          <p:nvPr>
+            <p:ph type="sldNum" idx="12"/>
+          </p:nvPr>
+        </p:nvSpPr>
+        <p:spPr/>
+        <p:txBody>
+          <a:bodyPr/>
+          <a:lstStyle/>
+          <a:p>
+            <a:pPr marL="0" lvl="0" indent="0" algn="r" rtl="0">
+              <a:spcBef>
+                <a:spcPts val="0"/>
+              </a:spcBef>
+              <a:spcAft>
+                <a:spcPts val="0"/>
+              </a:spcAft>
+              <a:buNone/>
+            </a:pPr>
+            <a:fld id="{00000000-1234-1234-1234-123412341234}" type="slidenum">
+              <a:rPr lang="en" smtClean="0"/>
+              <a:t>8</a:t>
+            </a:fld>
+            <a:endParaRPr lang="en"/>
+          </a:p>
+        </p:txBody>
+      </p:sp>
     </p:spTree>
   </p:cSld>
   <p:clrMapOvr>
@@ -14518,7 +15288,7 @@
               </a:spcAft>
               <a:buNone/>
             </a:pPr>
-            <a:endParaRPr dirty="0"/>
+            <a:endParaRPr sz="1600" dirty="0"/>
           </a:p>
           <a:p>
             <a:pPr marL="0" lvl="0" indent="0" algn="l" rtl="0">
@@ -14545,6 +15315,9 @@
             <a:endParaRPr dirty="0"/>
           </a:p>
           <a:p>
+            <a:pPr marL="146050" indent="0">
+              <a:buNone/>
+            </a:pPr>
             <a:r>
               <a:rPr lang="en-US" dirty="0"/>
               <a:t>						</a:t>
@@ -14620,6 +15393,38 @@
               <a:buNone/>
             </a:pPr>
             <a:endParaRPr dirty="0"/>
+          </a:p>
+        </p:txBody>
+      </p:sp>
+      <p:sp>
+        <p:nvSpPr>
+          <p:cNvPr id="2" name="Slide Number Placeholder 1"/>
+          <p:cNvSpPr>
+            <a:spLocks noGrp="1"/>
+          </p:cNvSpPr>
+          <p:nvPr>
+            <p:ph type="sldNum" idx="12"/>
+          </p:nvPr>
+        </p:nvSpPr>
+        <p:spPr/>
+        <p:txBody>
+          <a:bodyPr/>
+          <a:lstStyle/>
+          <a:p>
+            <a:pPr marL="0" lvl="0" indent="0" algn="r" rtl="0">
+              <a:spcBef>
+                <a:spcPts val="0"/>
+              </a:spcBef>
+              <a:spcAft>
+                <a:spcPts val="0"/>
+              </a:spcAft>
+              <a:buNone/>
+            </a:pPr>
+            <a:fld id="{00000000-1234-1234-1234-123412341234}" type="slidenum">
+              <a:rPr lang="en" smtClean="0"/>
+              <a:t>9</a:t>
+            </a:fld>
+            <a:endParaRPr lang="en"/>
           </a:p>
         </p:txBody>
       </p:sp>

</xml_diff>